<commit_message>
Updated alternate text descriptions for nutritional labels
</commit_message>
<xml_diff>
--- a/Resources/CarbGuide.pptx
+++ b/Resources/CarbGuide.pptx
@@ -6,16 +6,16 @@
   </p:sldMasterIdLst>
   <p:sldIdLst>
     <p:sldId id="263" r:id="rId2"/>
-    <p:sldId id="256" r:id="rId3"/>
-    <p:sldId id="257" r:id="rId4"/>
-    <p:sldId id="258" r:id="rId5"/>
-    <p:sldId id="259" r:id="rId6"/>
-    <p:sldId id="260" r:id="rId7"/>
-    <p:sldId id="261" r:id="rId8"/>
-    <p:sldId id="262" r:id="rId9"/>
-    <p:sldId id="264" r:id="rId10"/>
-    <p:sldId id="265" r:id="rId11"/>
-    <p:sldId id="266" r:id="rId12"/>
+    <p:sldId id="260" r:id="rId3"/>
+    <p:sldId id="259" r:id="rId4"/>
+    <p:sldId id="266" r:id="rId5"/>
+    <p:sldId id="256" r:id="rId6"/>
+    <p:sldId id="257" r:id="rId7"/>
+    <p:sldId id="258" r:id="rId8"/>
+    <p:sldId id="261" r:id="rId9"/>
+    <p:sldId id="262" r:id="rId10"/>
+    <p:sldId id="264" r:id="rId11"/>
+    <p:sldId id="265" r:id="rId12"/>
   </p:sldIdLst>
   <p:sldSz cx="12192000" cy="6858000"/>
   <p:notesSz cx="6858000" cy="9144000"/>
@@ -120,16 +120,16 @@
         <p14:section name="Proteins" id="{49E51465-CE8A-424F-9D7E-AABECC07C10A}">
           <p14:sldIdLst>
             <p14:sldId id="263"/>
+            <p14:sldId id="260"/>
+            <p14:sldId id="259"/>
+            <p14:sldId id="266"/>
             <p14:sldId id="256"/>
             <p14:sldId id="257"/>
             <p14:sldId id="258"/>
-            <p14:sldId id="259"/>
-            <p14:sldId id="260"/>
             <p14:sldId id="261"/>
             <p14:sldId id="262"/>
             <p14:sldId id="264"/>
             <p14:sldId id="265"/>
-            <p14:sldId id="266"/>
           </p14:sldIdLst>
         </p14:section>
       </p14:sectionLst>
@@ -272,7 +272,7 @@
           <a:p>
             <a:fld id="{E9BF1F2D-2AEF-4074-BE6D-430396F80950}" type="datetimeFigureOut">
               <a:rPr lang="en-US" smtClean="0"/>
-              <a:t>3/29/2020</a:t>
+              <a:t>4/6/2020</a:t>
             </a:fld>
             <a:endParaRPr lang="en-US"/>
           </a:p>
@@ -442,7 +442,7 @@
           <a:p>
             <a:fld id="{E9BF1F2D-2AEF-4074-BE6D-430396F80950}" type="datetimeFigureOut">
               <a:rPr lang="en-US" smtClean="0"/>
-              <a:t>3/29/2020</a:t>
+              <a:t>4/6/2020</a:t>
             </a:fld>
             <a:endParaRPr lang="en-US"/>
           </a:p>
@@ -622,7 +622,7 @@
           <a:p>
             <a:fld id="{E9BF1F2D-2AEF-4074-BE6D-430396F80950}" type="datetimeFigureOut">
               <a:rPr lang="en-US" smtClean="0"/>
-              <a:t>3/29/2020</a:t>
+              <a:t>4/6/2020</a:t>
             </a:fld>
             <a:endParaRPr lang="en-US"/>
           </a:p>
@@ -792,7 +792,7 @@
           <a:p>
             <a:fld id="{E9BF1F2D-2AEF-4074-BE6D-430396F80950}" type="datetimeFigureOut">
               <a:rPr lang="en-US" smtClean="0"/>
-              <a:t>3/29/2020</a:t>
+              <a:t>4/6/2020</a:t>
             </a:fld>
             <a:endParaRPr lang="en-US"/>
           </a:p>
@@ -1036,7 +1036,7 @@
           <a:p>
             <a:fld id="{E9BF1F2D-2AEF-4074-BE6D-430396F80950}" type="datetimeFigureOut">
               <a:rPr lang="en-US" smtClean="0"/>
-              <a:t>3/29/2020</a:t>
+              <a:t>4/6/2020</a:t>
             </a:fld>
             <a:endParaRPr lang="en-US"/>
           </a:p>
@@ -1268,7 +1268,7 @@
           <a:p>
             <a:fld id="{E9BF1F2D-2AEF-4074-BE6D-430396F80950}" type="datetimeFigureOut">
               <a:rPr lang="en-US" smtClean="0"/>
-              <a:t>3/29/2020</a:t>
+              <a:t>4/6/2020</a:t>
             </a:fld>
             <a:endParaRPr lang="en-US"/>
           </a:p>
@@ -1635,7 +1635,7 @@
           <a:p>
             <a:fld id="{E9BF1F2D-2AEF-4074-BE6D-430396F80950}" type="datetimeFigureOut">
               <a:rPr lang="en-US" smtClean="0"/>
-              <a:t>3/29/2020</a:t>
+              <a:t>4/6/2020</a:t>
             </a:fld>
             <a:endParaRPr lang="en-US"/>
           </a:p>
@@ -1753,7 +1753,7 @@
           <a:p>
             <a:fld id="{E9BF1F2D-2AEF-4074-BE6D-430396F80950}" type="datetimeFigureOut">
               <a:rPr lang="en-US" smtClean="0"/>
-              <a:t>3/29/2020</a:t>
+              <a:t>4/6/2020</a:t>
             </a:fld>
             <a:endParaRPr lang="en-US"/>
           </a:p>
@@ -1848,7 +1848,7 @@
           <a:p>
             <a:fld id="{E9BF1F2D-2AEF-4074-BE6D-430396F80950}" type="datetimeFigureOut">
               <a:rPr lang="en-US" smtClean="0"/>
-              <a:t>3/29/2020</a:t>
+              <a:t>4/6/2020</a:t>
             </a:fld>
             <a:endParaRPr lang="en-US"/>
           </a:p>
@@ -2125,7 +2125,7 @@
           <a:p>
             <a:fld id="{E9BF1F2D-2AEF-4074-BE6D-430396F80950}" type="datetimeFigureOut">
               <a:rPr lang="en-US" smtClean="0"/>
-              <a:t>3/29/2020</a:t>
+              <a:t>4/6/2020</a:t>
             </a:fld>
             <a:endParaRPr lang="en-US"/>
           </a:p>
@@ -2382,7 +2382,7 @@
           <a:p>
             <a:fld id="{E9BF1F2D-2AEF-4074-BE6D-430396F80950}" type="datetimeFigureOut">
               <a:rPr lang="en-US" smtClean="0"/>
-              <a:t>3/29/2020</a:t>
+              <a:t>4/6/2020</a:t>
             </a:fld>
             <a:endParaRPr lang="en-US"/>
           </a:p>
@@ -2595,7 +2595,7 @@
           <a:p>
             <a:fld id="{E9BF1F2D-2AEF-4074-BE6D-430396F80950}" type="datetimeFigureOut">
               <a:rPr lang="en-US" smtClean="0"/>
-              <a:t>3/29/2020</a:t>
+              <a:t>4/6/2020</a:t>
             </a:fld>
             <a:endParaRPr lang="en-US"/>
           </a:p>
@@ -3089,7 +3089,7 @@
       </p:grpSpPr>
       <p:pic>
         <p:nvPicPr>
-          <p:cNvPr id="3" name="Picture 2">
+          <p:cNvPr id="3" name="Picture 2" descr="Spinach nutritional label: Serving size 1 cup., calories 7, total fat 0g (0%), saturated fat 0g, polyunsaturated fat 0g, monounsaturated fat 0g, total carbohydrates 1g (1%), dietary fiber 0.7g, sugars 0.1g, proteins 0.7g (0%)">
             <a:extLst>
               <a:ext uri="{FF2B5EF4-FFF2-40B4-BE49-F238E27FC236}">
                 <a16:creationId xmlns:a16="http://schemas.microsoft.com/office/drawing/2014/main" id="{5A7052CE-EF89-497E-A5CA-5BEC081A231F}"/>
@@ -3124,7 +3124,107 @@
       </p:pic>
       <p:pic>
         <p:nvPicPr>
-          <p:cNvPr id="9" name="Picture 8">
+          <p:cNvPr id="9" name="Picture 8" descr="Spinach food tracker showing 0% fat, 60% carbs, and 40% protein">
+            <a:extLst>
+              <a:ext uri="{FF2B5EF4-FFF2-40B4-BE49-F238E27FC236}">
+                <a16:creationId xmlns:a16="http://schemas.microsoft.com/office/drawing/2014/main" id="{AA421ED5-228F-4ACC-9C2F-54AA94CD57F4}"/>
+              </a:ext>
+            </a:extLst>
+          </p:cNvPr>
+          <p:cNvPicPr>
+            <a:picLocks noChangeAspect="1"/>
+          </p:cNvPicPr>
+          <p:nvPr/>
+        </p:nvPicPr>
+        <p:blipFill>
+          <a:blip r:embed="rId3">
+            <a:extLst>
+              <a:ext uri="{28A0092B-C50C-407E-A947-70E740481C1C}">
+                <a14:useLocalDpi xmlns:a14="http://schemas.microsoft.com/office/drawing/2010/main" val="0"/>
+              </a:ext>
+            </a:extLst>
+          </a:blip>
+          <a:srcRect/>
+          <a:stretch/>
+        </p:blipFill>
+        <p:spPr>
+          <a:xfrm>
+            <a:off x="6481974" y="347472"/>
+            <a:ext cx="5341315" cy="6163055"/>
+          </a:xfrm>
+          <a:prstGeom prst="rect">
+            <a:avLst/>
+          </a:prstGeom>
+        </p:spPr>
+      </p:pic>
+    </p:spTree>
+    <p:extLst>
+      <p:ext uri="{BB962C8B-B14F-4D97-AF65-F5344CB8AC3E}">
+        <p14:creationId xmlns:p14="http://schemas.microsoft.com/office/powerpoint/2010/main" val="3860751518"/>
+      </p:ext>
+    </p:extLst>
+  </p:cSld>
+  <p:clrMapOvr>
+    <a:masterClrMapping/>
+  </p:clrMapOvr>
+</p:sld>
+</file>
+
+<file path=ppt/slides/slide11.xml><?xml version="1.0" encoding="utf-8"?>
+<p:sld xmlns:a="http://schemas.openxmlformats.org/drawingml/2006/main" xmlns:r="http://schemas.openxmlformats.org/officeDocument/2006/relationships" xmlns:p="http://schemas.openxmlformats.org/presentationml/2006/main">
+  <p:cSld>
+    <p:spTree>
+      <p:nvGrpSpPr>
+        <p:cNvPr id="1" name=""/>
+        <p:cNvGrpSpPr/>
+        <p:nvPr/>
+      </p:nvGrpSpPr>
+      <p:grpSpPr>
+        <a:xfrm>
+          <a:off x="0" y="0"/>
+          <a:ext cx="0" cy="0"/>
+          <a:chOff x="0" y="0"/>
+          <a:chExt cx="0" cy="0"/>
+        </a:xfrm>
+      </p:grpSpPr>
+      <p:pic>
+        <p:nvPicPr>
+          <p:cNvPr id="3" name="Picture 2" descr="Strawberries nutritional label: Serving size 1 cup., calories 50, total fat 0g (0%), saturated fat 0g, polyunsaturated fat 0g, monounsaturated fat 0g, total carbohydrates 13g (14%), dietary fiber 3g, sugars 9g, proteins 0g (0%)">
+            <a:extLst>
+              <a:ext uri="{FF2B5EF4-FFF2-40B4-BE49-F238E27FC236}">
+                <a16:creationId xmlns:a16="http://schemas.microsoft.com/office/drawing/2014/main" id="{5A7052CE-EF89-497E-A5CA-5BEC081A231F}"/>
+              </a:ext>
+            </a:extLst>
+          </p:cNvPr>
+          <p:cNvPicPr>
+            <a:picLocks noChangeAspect="1"/>
+          </p:cNvPicPr>
+          <p:nvPr/>
+        </p:nvPicPr>
+        <p:blipFill>
+          <a:blip r:embed="rId2">
+            <a:extLst>
+              <a:ext uri="{28A0092B-C50C-407E-A947-70E740481C1C}">
+                <a14:useLocalDpi xmlns:a14="http://schemas.microsoft.com/office/drawing/2010/main" val="0"/>
+              </a:ext>
+            </a:extLst>
+          </a:blip>
+          <a:srcRect/>
+          <a:stretch/>
+        </p:blipFill>
+        <p:spPr>
+          <a:xfrm>
+            <a:off x="320040" y="988887"/>
+            <a:ext cx="5464456" cy="4880226"/>
+          </a:xfrm>
+          <a:prstGeom prst="rect">
+            <a:avLst/>
+          </a:prstGeom>
+        </p:spPr>
+      </p:pic>
+      <p:pic>
+        <p:nvPicPr>
+          <p:cNvPr id="9" name="Picture 8" descr="Strawberries food tracker showing 0% fat, 100% carbs, and 0% protein">
             <a:extLst>
               <a:ext uri="{FF2B5EF4-FFF2-40B4-BE49-F238E27FC236}">
                 <a16:creationId xmlns:a16="http://schemas.microsoft.com/office/drawing/2014/main" id="{AA421ED5-228F-4ACC-9C2F-54AA94CD57F4}"/>
@@ -3170,7 +3270,7 @@
 </p:sld>
 </file>
 
-<file path=ppt/slides/slide11.xml><?xml version="1.0" encoding="utf-8"?>
+<file path=ppt/slides/slide2.xml><?xml version="1.0" encoding="utf-8"?>
 <p:sld xmlns:a="http://schemas.openxmlformats.org/drawingml/2006/main" xmlns:r="http://schemas.openxmlformats.org/officeDocument/2006/relationships" xmlns:p="http://schemas.openxmlformats.org/presentationml/2006/main">
   <p:cSld>
     <p:spTree>
@@ -3189,7 +3289,207 @@
       </p:grpSpPr>
       <p:pic>
         <p:nvPicPr>
-          <p:cNvPr id="3" name="Picture 2">
+          <p:cNvPr id="3" name="Picture 2" descr="2% milk nutritional label: Serving size 8 oz. (236 ml)., calories 120, total fat 5g (9%), saturated fat 3g, polyunsaturated fat 0g, monounsaturated fat 0g, total carbohydrates 12g (13%), dietary fiber 0g, sugars 11g, proteins 8g (5%)">
+            <a:extLst>
+              <a:ext uri="{FF2B5EF4-FFF2-40B4-BE49-F238E27FC236}">
+                <a16:creationId xmlns:a16="http://schemas.microsoft.com/office/drawing/2014/main" id="{8F732D9E-B16A-4CE0-83A2-74102A49EDF9}"/>
+              </a:ext>
+            </a:extLst>
+          </p:cNvPr>
+          <p:cNvPicPr>
+            <a:picLocks noChangeAspect="1"/>
+          </p:cNvPicPr>
+          <p:nvPr/>
+        </p:nvPicPr>
+        <p:blipFill>
+          <a:blip r:embed="rId2">
+            <a:extLst>
+              <a:ext uri="{28A0092B-C50C-407E-A947-70E740481C1C}">
+                <a14:useLocalDpi xmlns:a14="http://schemas.microsoft.com/office/drawing/2010/main" val="0"/>
+              </a:ext>
+            </a:extLst>
+          </a:blip>
+          <a:srcRect/>
+          <a:stretch/>
+        </p:blipFill>
+        <p:spPr>
+          <a:xfrm>
+            <a:off x="320040" y="988887"/>
+            <a:ext cx="5464456" cy="4880226"/>
+          </a:xfrm>
+          <a:prstGeom prst="rect">
+            <a:avLst/>
+          </a:prstGeom>
+        </p:spPr>
+      </p:pic>
+      <p:pic>
+        <p:nvPicPr>
+          <p:cNvPr id="9" name="Picture 8" descr="2% milk food tracker showing 36% fat, 38% carbs, and 26% protein">
+            <a:extLst>
+              <a:ext uri="{FF2B5EF4-FFF2-40B4-BE49-F238E27FC236}">
+                <a16:creationId xmlns:a16="http://schemas.microsoft.com/office/drawing/2014/main" id="{A3B83438-F7D5-46F7-84C0-5BD830BB4C3B}"/>
+              </a:ext>
+            </a:extLst>
+          </p:cNvPr>
+          <p:cNvPicPr>
+            <a:picLocks noChangeAspect="1"/>
+          </p:cNvPicPr>
+          <p:nvPr/>
+        </p:nvPicPr>
+        <p:blipFill>
+          <a:blip r:embed="rId3">
+            <a:extLst>
+              <a:ext uri="{28A0092B-C50C-407E-A947-70E740481C1C}">
+                <a14:useLocalDpi xmlns:a14="http://schemas.microsoft.com/office/drawing/2010/main" val="0"/>
+              </a:ext>
+            </a:extLst>
+          </a:blip>
+          <a:srcRect/>
+          <a:stretch/>
+        </p:blipFill>
+        <p:spPr>
+          <a:xfrm>
+            <a:off x="6476302" y="347472"/>
+            <a:ext cx="5341315" cy="6163056"/>
+          </a:xfrm>
+          <a:prstGeom prst="rect">
+            <a:avLst/>
+          </a:prstGeom>
+        </p:spPr>
+      </p:pic>
+    </p:spTree>
+    <p:extLst>
+      <p:ext uri="{BB962C8B-B14F-4D97-AF65-F5344CB8AC3E}">
+        <p14:creationId xmlns:p14="http://schemas.microsoft.com/office/powerpoint/2010/main" val="3153578109"/>
+      </p:ext>
+    </p:extLst>
+  </p:cSld>
+  <p:clrMapOvr>
+    <a:masterClrMapping/>
+  </p:clrMapOvr>
+</p:sld>
+</file>
+
+<file path=ppt/slides/slide3.xml><?xml version="1.0" encoding="utf-8"?>
+<p:sld xmlns:a="http://schemas.openxmlformats.org/drawingml/2006/main" xmlns:r="http://schemas.openxmlformats.org/officeDocument/2006/relationships" xmlns:p="http://schemas.openxmlformats.org/presentationml/2006/main">
+  <p:cSld>
+    <p:spTree>
+      <p:nvGrpSpPr>
+        <p:cNvPr id="1" name=""/>
+        <p:cNvGrpSpPr/>
+        <p:nvPr/>
+      </p:nvGrpSpPr>
+      <p:grpSpPr>
+        <a:xfrm>
+          <a:off x="0" y="0"/>
+          <a:ext cx="0" cy="0"/>
+          <a:chOff x="0" y="0"/>
+          <a:chExt cx="0" cy="0"/>
+        </a:xfrm>
+      </p:grpSpPr>
+      <p:pic>
+        <p:nvPicPr>
+          <p:cNvPr id="3" name="Picture 2" descr="Baby carrots nutritional label: Serving size 3 oz (85g)., calories 35, total fat 0g (0%), saturated fat 0g, polyunsaturated fat 0g, monounsaturated fat 0g, total carbohydrates 8g (9%), dietary fiber 2g, sugars 5g, proteins 1g (0%)">
+            <a:extLst>
+              <a:ext uri="{FF2B5EF4-FFF2-40B4-BE49-F238E27FC236}">
+                <a16:creationId xmlns:a16="http://schemas.microsoft.com/office/drawing/2014/main" id="{D4094881-8A73-4191-88C5-AE902DAF078D}"/>
+              </a:ext>
+            </a:extLst>
+          </p:cNvPr>
+          <p:cNvPicPr>
+            <a:picLocks noChangeAspect="1"/>
+          </p:cNvPicPr>
+          <p:nvPr/>
+        </p:nvPicPr>
+        <p:blipFill>
+          <a:blip r:embed="rId2">
+            <a:extLst>
+              <a:ext uri="{28A0092B-C50C-407E-A947-70E740481C1C}">
+                <a14:useLocalDpi xmlns:a14="http://schemas.microsoft.com/office/drawing/2010/main" val="0"/>
+              </a:ext>
+            </a:extLst>
+          </a:blip>
+          <a:srcRect/>
+          <a:stretch/>
+        </p:blipFill>
+        <p:spPr>
+          <a:xfrm>
+            <a:off x="320040" y="988887"/>
+            <a:ext cx="5464456" cy="4880226"/>
+          </a:xfrm>
+          <a:prstGeom prst="rect">
+            <a:avLst/>
+          </a:prstGeom>
+        </p:spPr>
+      </p:pic>
+      <p:pic>
+        <p:nvPicPr>
+          <p:cNvPr id="9" name="Picture 8" descr="Baby carrots food tracker showing 0% fat, 89% carbs, and 11% protein">
+            <a:extLst>
+              <a:ext uri="{FF2B5EF4-FFF2-40B4-BE49-F238E27FC236}">
+                <a16:creationId xmlns:a16="http://schemas.microsoft.com/office/drawing/2014/main" id="{0E8E4F9C-C06E-4F2A-8A32-0ECA26EDE1D5}"/>
+              </a:ext>
+            </a:extLst>
+          </p:cNvPr>
+          <p:cNvPicPr>
+            <a:picLocks noChangeAspect="1"/>
+          </p:cNvPicPr>
+          <p:nvPr/>
+        </p:nvPicPr>
+        <p:blipFill>
+          <a:blip r:embed="rId3">
+            <a:extLst>
+              <a:ext uri="{28A0092B-C50C-407E-A947-70E740481C1C}">
+                <a14:useLocalDpi xmlns:a14="http://schemas.microsoft.com/office/drawing/2010/main" val="0"/>
+              </a:ext>
+            </a:extLst>
+          </a:blip>
+          <a:srcRect/>
+          <a:stretch/>
+        </p:blipFill>
+        <p:spPr>
+          <a:xfrm>
+            <a:off x="6522343" y="347472"/>
+            <a:ext cx="5341315" cy="6163056"/>
+          </a:xfrm>
+          <a:prstGeom prst="rect">
+            <a:avLst/>
+          </a:prstGeom>
+        </p:spPr>
+      </p:pic>
+    </p:spTree>
+    <p:extLst>
+      <p:ext uri="{BB962C8B-B14F-4D97-AF65-F5344CB8AC3E}">
+        <p14:creationId xmlns:p14="http://schemas.microsoft.com/office/powerpoint/2010/main" val="90669892"/>
+      </p:ext>
+    </p:extLst>
+  </p:cSld>
+  <p:clrMapOvr>
+    <a:masterClrMapping/>
+  </p:clrMapOvr>
+</p:sld>
+</file>
+
+<file path=ppt/slides/slide4.xml><?xml version="1.0" encoding="utf-8"?>
+<p:sld xmlns:a="http://schemas.openxmlformats.org/drawingml/2006/main" xmlns:r="http://schemas.openxmlformats.org/officeDocument/2006/relationships" xmlns:p="http://schemas.openxmlformats.org/presentationml/2006/main">
+  <p:cSld>
+    <p:spTree>
+      <p:nvGrpSpPr>
+        <p:cNvPr id="1" name=""/>
+        <p:cNvGrpSpPr/>
+        <p:nvPr/>
+      </p:nvGrpSpPr>
+      <p:grpSpPr>
+        <a:xfrm>
+          <a:off x="0" y="0"/>
+          <a:ext cx="0" cy="0"/>
+          <a:chOff x="0" y="0"/>
+          <a:chExt cx="0" cy="0"/>
+        </a:xfrm>
+      </p:grpSpPr>
+      <p:pic>
+        <p:nvPicPr>
+          <p:cNvPr id="3" name="Picture 2" descr="Baked sweet potato nutritional label: Serving size 1 medium., calories 112, total fat 0g (0%), saturated fat 0g, polyunsaturated fat 0g, monounsaturated fat 0g, total carbohydrates 26g (28%), dietary fiber 4g, sugars 5g, proteins 2g (1%)">
             <a:extLst>
               <a:ext uri="{FF2B5EF4-FFF2-40B4-BE49-F238E27FC236}">
                 <a16:creationId xmlns:a16="http://schemas.microsoft.com/office/drawing/2014/main" id="{5A7052CE-EF89-497E-A5CA-5BEC081A231F}"/>
@@ -3224,7 +3524,7 @@
       </p:pic>
       <p:pic>
         <p:nvPicPr>
-          <p:cNvPr id="9" name="Picture 8">
+          <p:cNvPr id="9" name="Picture 8" descr="Baked sweet potato food tracker showing 1% fat, 92% carbs, and 7% protein">
             <a:extLst>
               <a:ext uri="{FF2B5EF4-FFF2-40B4-BE49-F238E27FC236}">
                 <a16:creationId xmlns:a16="http://schemas.microsoft.com/office/drawing/2014/main" id="{AA421ED5-228F-4ACC-9C2F-54AA94CD57F4}"/>
@@ -3270,7 +3570,7 @@
 </p:sld>
 </file>
 
-<file path=ppt/slides/slide2.xml><?xml version="1.0" encoding="utf-8"?>
+<file path=ppt/slides/slide5.xml><?xml version="1.0" encoding="utf-8"?>
 <p:sld xmlns:a="http://schemas.openxmlformats.org/drawingml/2006/main" xmlns:r="http://schemas.openxmlformats.org/officeDocument/2006/relationships" xmlns:p="http://schemas.openxmlformats.org/presentationml/2006/main">
   <p:cSld>
     <p:bg>
@@ -3297,7 +3597,7 @@
       </p:grpSpPr>
       <p:pic>
         <p:nvPicPr>
-          <p:cNvPr id="11" name="Picture 10">
+          <p:cNvPr id="11" name="Picture 10" descr="Banana food tracker showing 3% fat, 93% carbs, and 4% protein">
             <a:extLst>
               <a:ext uri="{FF2B5EF4-FFF2-40B4-BE49-F238E27FC236}">
                 <a16:creationId xmlns:a16="http://schemas.microsoft.com/office/drawing/2014/main" id="{D976D418-E3A2-4580-B393-F4B56AAE9934}"/>
@@ -3332,7 +3632,7 @@
       </p:pic>
       <p:pic>
         <p:nvPicPr>
-          <p:cNvPr id="13" name="Picture 12">
+          <p:cNvPr id="13" name="Picture 12" descr="Banana nutritional label: Serving size 1 medium., calories 105, total fat 0.4g (0%), saturated fat 0.1g, polyunsaturated fat 0g, monounsaturated fat 0g, total carbohydrates 27g (29%), dietary fiber 3.1g, sugars 14.4g, proteins 1.3g (0%)">
             <a:extLst>
               <a:ext uri="{FF2B5EF4-FFF2-40B4-BE49-F238E27FC236}">
                 <a16:creationId xmlns:a16="http://schemas.microsoft.com/office/drawing/2014/main" id="{B57C9DB3-7DA4-4213-A1B6-F73520C0DA89}"/>
@@ -3378,7 +3678,7 @@
 </p:sld>
 </file>
 
-<file path=ppt/slides/slide3.xml><?xml version="1.0" encoding="utf-8"?>
+<file path=ppt/slides/slide6.xml><?xml version="1.0" encoding="utf-8"?>
 <p:sld xmlns:a="http://schemas.openxmlformats.org/drawingml/2006/main" xmlns:r="http://schemas.openxmlformats.org/officeDocument/2006/relationships" xmlns:p="http://schemas.openxmlformats.org/presentationml/2006/main">
   <p:cSld>
     <p:spTree>
@@ -3397,7 +3697,7 @@
       </p:grpSpPr>
       <p:pic>
         <p:nvPicPr>
-          <p:cNvPr id="3" name="Picture 2">
+          <p:cNvPr id="3" name="Picture 2" descr="Black beans nutritional label: Serving size 1/2 cup., calories 312, total fat 0.8g (1%), saturated fat 0.2g, polyunsaturated fat 0.4g, monounsaturated fat 0.1g, total carbohydrates 58g (62%), dietary fiber 14g, sugars 2g, proteins 20g (13%)">
             <a:extLst>
               <a:ext uri="{FF2B5EF4-FFF2-40B4-BE49-F238E27FC236}">
                 <a16:creationId xmlns:a16="http://schemas.microsoft.com/office/drawing/2014/main" id="{93541BCE-4AB7-487E-B562-B4EABBC61213}"/>
@@ -3432,7 +3732,7 @@
       </p:pic>
       <p:pic>
         <p:nvPicPr>
-          <p:cNvPr id="9" name="Picture 8">
+          <p:cNvPr id="9" name="Picture 8" descr="Black beans food tracker showing 2% fat, 25% carbs, and 92% protein">
             <a:extLst>
               <a:ext uri="{FF2B5EF4-FFF2-40B4-BE49-F238E27FC236}">
                 <a16:creationId xmlns:a16="http://schemas.microsoft.com/office/drawing/2014/main" id="{FCB3D9A8-54CC-480B-8007-8FB9D6DD3A52}"/>
@@ -3478,7 +3778,7 @@
 </p:sld>
 </file>
 
-<file path=ppt/slides/slide4.xml><?xml version="1.0" encoding="utf-8"?>
+<file path=ppt/slides/slide7.xml><?xml version="1.0" encoding="utf-8"?>
 <p:sld xmlns:a="http://schemas.openxmlformats.org/drawingml/2006/main" xmlns:r="http://schemas.openxmlformats.org/officeDocument/2006/relationships" xmlns:p="http://schemas.openxmlformats.org/presentationml/2006/main">
   <p:cSld>
     <p:spTree>
@@ -3497,7 +3797,7 @@
       </p:grpSpPr>
       <p:pic>
         <p:nvPicPr>
-          <p:cNvPr id="3" name="Picture 2">
+          <p:cNvPr id="3" name="Picture 2" descr="Bread nutritional label: Serving size 1 slice., calories 110, total fat 2g (3%), saturated fat 0g, polyunsaturated fat 0g, monounsaturated fat 0g, total carbohydrates 20g (21%), dietary fiber 5g, sugars 4g, proteins 5g (3%)">
             <a:extLst>
               <a:ext uri="{FF2B5EF4-FFF2-40B4-BE49-F238E27FC236}">
                 <a16:creationId xmlns:a16="http://schemas.microsoft.com/office/drawing/2014/main" id="{2E274029-3CB9-4D3F-8CEB-63C4F6EA58A2}"/>
@@ -3532,7 +3832,7 @@
       </p:pic>
       <p:pic>
         <p:nvPicPr>
-          <p:cNvPr id="9" name="Picture 8">
+          <p:cNvPr id="9" name="Picture 8" descr="Bread food tracker showing 15% fat, 68% carbs, and 17% protein">
             <a:extLst>
               <a:ext uri="{FF2B5EF4-FFF2-40B4-BE49-F238E27FC236}">
                 <a16:creationId xmlns:a16="http://schemas.microsoft.com/office/drawing/2014/main" id="{1DD3E820-548F-49FD-9BC0-B37D771125A6}"/>
@@ -3578,7 +3878,7 @@
 </p:sld>
 </file>
 
-<file path=ppt/slides/slide5.xml><?xml version="1.0" encoding="utf-8"?>
+<file path=ppt/slides/slide8.xml><?xml version="1.0" encoding="utf-8"?>
 <p:sld xmlns:a="http://schemas.openxmlformats.org/drawingml/2006/main" xmlns:r="http://schemas.openxmlformats.org/officeDocument/2006/relationships" xmlns:p="http://schemas.openxmlformats.org/presentationml/2006/main">
   <p:cSld>
     <p:spTree>
@@ -3597,207 +3897,7 @@
       </p:grpSpPr>
       <p:pic>
         <p:nvPicPr>
-          <p:cNvPr id="3" name="Picture 2">
-            <a:extLst>
-              <a:ext uri="{FF2B5EF4-FFF2-40B4-BE49-F238E27FC236}">
-                <a16:creationId xmlns:a16="http://schemas.microsoft.com/office/drawing/2014/main" id="{D4094881-8A73-4191-88C5-AE902DAF078D}"/>
-              </a:ext>
-            </a:extLst>
-          </p:cNvPr>
-          <p:cNvPicPr>
-            <a:picLocks noChangeAspect="1"/>
-          </p:cNvPicPr>
-          <p:nvPr/>
-        </p:nvPicPr>
-        <p:blipFill>
-          <a:blip r:embed="rId2">
-            <a:extLst>
-              <a:ext uri="{28A0092B-C50C-407E-A947-70E740481C1C}">
-                <a14:useLocalDpi xmlns:a14="http://schemas.microsoft.com/office/drawing/2010/main" val="0"/>
-              </a:ext>
-            </a:extLst>
-          </a:blip>
-          <a:srcRect/>
-          <a:stretch/>
-        </p:blipFill>
-        <p:spPr>
-          <a:xfrm>
-            <a:off x="320040" y="988887"/>
-            <a:ext cx="5464456" cy="4880226"/>
-          </a:xfrm>
-          <a:prstGeom prst="rect">
-            <a:avLst/>
-          </a:prstGeom>
-        </p:spPr>
-      </p:pic>
-      <p:pic>
-        <p:nvPicPr>
-          <p:cNvPr id="9" name="Picture 8">
-            <a:extLst>
-              <a:ext uri="{FF2B5EF4-FFF2-40B4-BE49-F238E27FC236}">
-                <a16:creationId xmlns:a16="http://schemas.microsoft.com/office/drawing/2014/main" id="{0E8E4F9C-C06E-4F2A-8A32-0ECA26EDE1D5}"/>
-              </a:ext>
-            </a:extLst>
-          </p:cNvPr>
-          <p:cNvPicPr>
-            <a:picLocks noChangeAspect="1"/>
-          </p:cNvPicPr>
-          <p:nvPr/>
-        </p:nvPicPr>
-        <p:blipFill>
-          <a:blip r:embed="rId3">
-            <a:extLst>
-              <a:ext uri="{28A0092B-C50C-407E-A947-70E740481C1C}">
-                <a14:useLocalDpi xmlns:a14="http://schemas.microsoft.com/office/drawing/2010/main" val="0"/>
-              </a:ext>
-            </a:extLst>
-          </a:blip>
-          <a:srcRect/>
-          <a:stretch/>
-        </p:blipFill>
-        <p:spPr>
-          <a:xfrm>
-            <a:off x="6522343" y="347472"/>
-            <a:ext cx="5341315" cy="6163056"/>
-          </a:xfrm>
-          <a:prstGeom prst="rect">
-            <a:avLst/>
-          </a:prstGeom>
-        </p:spPr>
-      </p:pic>
-    </p:spTree>
-    <p:extLst>
-      <p:ext uri="{BB962C8B-B14F-4D97-AF65-F5344CB8AC3E}">
-        <p14:creationId xmlns:p14="http://schemas.microsoft.com/office/powerpoint/2010/main" val="90669892"/>
-      </p:ext>
-    </p:extLst>
-  </p:cSld>
-  <p:clrMapOvr>
-    <a:masterClrMapping/>
-  </p:clrMapOvr>
-</p:sld>
-</file>
-
-<file path=ppt/slides/slide6.xml><?xml version="1.0" encoding="utf-8"?>
-<p:sld xmlns:a="http://schemas.openxmlformats.org/drawingml/2006/main" xmlns:r="http://schemas.openxmlformats.org/officeDocument/2006/relationships" xmlns:p="http://schemas.openxmlformats.org/presentationml/2006/main">
-  <p:cSld>
-    <p:spTree>
-      <p:nvGrpSpPr>
-        <p:cNvPr id="1" name=""/>
-        <p:cNvGrpSpPr/>
-        <p:nvPr/>
-      </p:nvGrpSpPr>
-      <p:grpSpPr>
-        <a:xfrm>
-          <a:off x="0" y="0"/>
-          <a:ext cx="0" cy="0"/>
-          <a:chOff x="0" y="0"/>
-          <a:chExt cx="0" cy="0"/>
-        </a:xfrm>
-      </p:grpSpPr>
-      <p:pic>
-        <p:nvPicPr>
-          <p:cNvPr id="3" name="Picture 2">
-            <a:extLst>
-              <a:ext uri="{FF2B5EF4-FFF2-40B4-BE49-F238E27FC236}">
-                <a16:creationId xmlns:a16="http://schemas.microsoft.com/office/drawing/2014/main" id="{8F732D9E-B16A-4CE0-83A2-74102A49EDF9}"/>
-              </a:ext>
-            </a:extLst>
-          </p:cNvPr>
-          <p:cNvPicPr>
-            <a:picLocks noChangeAspect="1"/>
-          </p:cNvPicPr>
-          <p:nvPr/>
-        </p:nvPicPr>
-        <p:blipFill>
-          <a:blip r:embed="rId2">
-            <a:extLst>
-              <a:ext uri="{28A0092B-C50C-407E-A947-70E740481C1C}">
-                <a14:useLocalDpi xmlns:a14="http://schemas.microsoft.com/office/drawing/2010/main" val="0"/>
-              </a:ext>
-            </a:extLst>
-          </a:blip>
-          <a:srcRect/>
-          <a:stretch/>
-        </p:blipFill>
-        <p:spPr>
-          <a:xfrm>
-            <a:off x="320040" y="988887"/>
-            <a:ext cx="5464456" cy="4880226"/>
-          </a:xfrm>
-          <a:prstGeom prst="rect">
-            <a:avLst/>
-          </a:prstGeom>
-        </p:spPr>
-      </p:pic>
-      <p:pic>
-        <p:nvPicPr>
-          <p:cNvPr id="9" name="Picture 8">
-            <a:extLst>
-              <a:ext uri="{FF2B5EF4-FFF2-40B4-BE49-F238E27FC236}">
-                <a16:creationId xmlns:a16="http://schemas.microsoft.com/office/drawing/2014/main" id="{A3B83438-F7D5-46F7-84C0-5BD830BB4C3B}"/>
-              </a:ext>
-            </a:extLst>
-          </p:cNvPr>
-          <p:cNvPicPr>
-            <a:picLocks noChangeAspect="1"/>
-          </p:cNvPicPr>
-          <p:nvPr/>
-        </p:nvPicPr>
-        <p:blipFill>
-          <a:blip r:embed="rId3">
-            <a:extLst>
-              <a:ext uri="{28A0092B-C50C-407E-A947-70E740481C1C}">
-                <a14:useLocalDpi xmlns:a14="http://schemas.microsoft.com/office/drawing/2010/main" val="0"/>
-              </a:ext>
-            </a:extLst>
-          </a:blip>
-          <a:srcRect/>
-          <a:stretch/>
-        </p:blipFill>
-        <p:spPr>
-          <a:xfrm>
-            <a:off x="6476302" y="347472"/>
-            <a:ext cx="5341315" cy="6163056"/>
-          </a:xfrm>
-          <a:prstGeom prst="rect">
-            <a:avLst/>
-          </a:prstGeom>
-        </p:spPr>
-      </p:pic>
-    </p:spTree>
-    <p:extLst>
-      <p:ext uri="{BB962C8B-B14F-4D97-AF65-F5344CB8AC3E}">
-        <p14:creationId xmlns:p14="http://schemas.microsoft.com/office/powerpoint/2010/main" val="3153578109"/>
-      </p:ext>
-    </p:extLst>
-  </p:cSld>
-  <p:clrMapOvr>
-    <a:masterClrMapping/>
-  </p:clrMapOvr>
-</p:sld>
-</file>
-
-<file path=ppt/slides/slide7.xml><?xml version="1.0" encoding="utf-8"?>
-<p:sld xmlns:a="http://schemas.openxmlformats.org/drawingml/2006/main" xmlns:r="http://schemas.openxmlformats.org/officeDocument/2006/relationships" xmlns:p="http://schemas.openxmlformats.org/presentationml/2006/main">
-  <p:cSld>
-    <p:spTree>
-      <p:nvGrpSpPr>
-        <p:cNvPr id="1" name=""/>
-        <p:cNvGrpSpPr/>
-        <p:nvPr/>
-      </p:nvGrpSpPr>
-      <p:grpSpPr>
-        <a:xfrm>
-          <a:off x="0" y="0"/>
-          <a:ext cx="0" cy="0"/>
-          <a:chOff x="0" y="0"/>
-          <a:chExt cx="0" cy="0"/>
-        </a:xfrm>
-      </p:grpSpPr>
-      <p:pic>
-        <p:nvPicPr>
-          <p:cNvPr id="3" name="Picture 2">
+          <p:cNvPr id="3" name="Picture 2" descr="Oats nutritional label: Serving size 1/2 cup., calories 150, total fat 2.5g (4%), saturated fat 0g, polyunsaturated fat 0g, monounsaturated fat 0g, total carbohydrates 27g (29%), dietary fiber 4g, sugars 1g, proteins 5g (3%)">
             <a:extLst>
               <a:ext uri="{FF2B5EF4-FFF2-40B4-BE49-F238E27FC236}">
                 <a16:creationId xmlns:a16="http://schemas.microsoft.com/office/drawing/2014/main" id="{7DA2B48C-E43C-4354-BAC5-EA0669D7D939}"/>
@@ -3832,7 +3932,7 @@
       </p:pic>
       <p:pic>
         <p:nvPicPr>
-          <p:cNvPr id="9" name="Picture 8">
+          <p:cNvPr id="9" name="Picture 8" descr="Oats food tracker showing 15% fat, 72% carbs, and 13% protein">
             <a:extLst>
               <a:ext uri="{FF2B5EF4-FFF2-40B4-BE49-F238E27FC236}">
                 <a16:creationId xmlns:a16="http://schemas.microsoft.com/office/drawing/2014/main" id="{6A7A7D94-B84B-4C72-B551-372AEDEBF27C}"/>
@@ -3878,7 +3978,7 @@
 </p:sld>
 </file>
 
-<file path=ppt/slides/slide8.xml><?xml version="1.0" encoding="utf-8"?>
+<file path=ppt/slides/slide9.xml><?xml version="1.0" encoding="utf-8"?>
 <p:sld xmlns:a="http://schemas.openxmlformats.org/drawingml/2006/main" xmlns:r="http://schemas.openxmlformats.org/officeDocument/2006/relationships" xmlns:p="http://schemas.openxmlformats.org/presentationml/2006/main">
   <p:cSld>
     <p:spTree>
@@ -3897,7 +3997,7 @@
       </p:grpSpPr>
       <p:pic>
         <p:nvPicPr>
-          <p:cNvPr id="3" name="Picture 2">
+          <p:cNvPr id="3" name="Picture 2" descr="Pasta nutritional label: Serving size 1 cup cooked., calories 220, total fat 1.5g (2%), saturated fat 0.2g, polyunsaturated fat 0.4g, monounsaturated fat 0.2g, total carbohydrates 43g (46%), dietary fiber 2.5g, sugars 0.8g, proteins 8g (5%)">
             <a:extLst>
               <a:ext uri="{FF2B5EF4-FFF2-40B4-BE49-F238E27FC236}">
                 <a16:creationId xmlns:a16="http://schemas.microsoft.com/office/drawing/2014/main" id="{5A7052CE-EF89-497E-A5CA-5BEC081A231F}"/>
@@ -3932,7 +4032,7 @@
       </p:pic>
       <p:pic>
         <p:nvPicPr>
-          <p:cNvPr id="9" name="Picture 8">
+          <p:cNvPr id="9" name="Picture 8" descr="Pasta food tracker showing 5% fat, 80% carbs, and 15% protein">
             <a:extLst>
               <a:ext uri="{FF2B5EF4-FFF2-40B4-BE49-F238E27FC236}">
                 <a16:creationId xmlns:a16="http://schemas.microsoft.com/office/drawing/2014/main" id="{AA421ED5-228F-4ACC-9C2F-54AA94CD57F4}"/>
@@ -3969,106 +4069,6 @@
     <p:extLst>
       <p:ext uri="{BB962C8B-B14F-4D97-AF65-F5344CB8AC3E}">
         <p14:creationId xmlns:p14="http://schemas.microsoft.com/office/powerpoint/2010/main" val="1801791457"/>
-      </p:ext>
-    </p:extLst>
-  </p:cSld>
-  <p:clrMapOvr>
-    <a:masterClrMapping/>
-  </p:clrMapOvr>
-</p:sld>
-</file>
-
-<file path=ppt/slides/slide9.xml><?xml version="1.0" encoding="utf-8"?>
-<p:sld xmlns:a="http://schemas.openxmlformats.org/drawingml/2006/main" xmlns:r="http://schemas.openxmlformats.org/officeDocument/2006/relationships" xmlns:p="http://schemas.openxmlformats.org/presentationml/2006/main">
-  <p:cSld>
-    <p:spTree>
-      <p:nvGrpSpPr>
-        <p:cNvPr id="1" name=""/>
-        <p:cNvGrpSpPr/>
-        <p:nvPr/>
-      </p:nvGrpSpPr>
-      <p:grpSpPr>
-        <a:xfrm>
-          <a:off x="0" y="0"/>
-          <a:ext cx="0" cy="0"/>
-          <a:chOff x="0" y="0"/>
-          <a:chExt cx="0" cy="0"/>
-        </a:xfrm>
-      </p:grpSpPr>
-      <p:pic>
-        <p:nvPicPr>
-          <p:cNvPr id="3" name="Picture 2">
-            <a:extLst>
-              <a:ext uri="{FF2B5EF4-FFF2-40B4-BE49-F238E27FC236}">
-                <a16:creationId xmlns:a16="http://schemas.microsoft.com/office/drawing/2014/main" id="{5A7052CE-EF89-497E-A5CA-5BEC081A231F}"/>
-              </a:ext>
-            </a:extLst>
-          </p:cNvPr>
-          <p:cNvPicPr>
-            <a:picLocks noChangeAspect="1"/>
-          </p:cNvPicPr>
-          <p:nvPr/>
-        </p:nvPicPr>
-        <p:blipFill>
-          <a:blip r:embed="rId2">
-            <a:extLst>
-              <a:ext uri="{28A0092B-C50C-407E-A947-70E740481C1C}">
-                <a14:useLocalDpi xmlns:a14="http://schemas.microsoft.com/office/drawing/2010/main" val="0"/>
-              </a:ext>
-            </a:extLst>
-          </a:blip>
-          <a:srcRect/>
-          <a:stretch/>
-        </p:blipFill>
-        <p:spPr>
-          <a:xfrm>
-            <a:off x="320040" y="988887"/>
-            <a:ext cx="5464456" cy="4880226"/>
-          </a:xfrm>
-          <a:prstGeom prst="rect">
-            <a:avLst/>
-          </a:prstGeom>
-        </p:spPr>
-      </p:pic>
-      <p:pic>
-        <p:nvPicPr>
-          <p:cNvPr id="9" name="Picture 8">
-            <a:extLst>
-              <a:ext uri="{FF2B5EF4-FFF2-40B4-BE49-F238E27FC236}">
-                <a16:creationId xmlns:a16="http://schemas.microsoft.com/office/drawing/2014/main" id="{AA421ED5-228F-4ACC-9C2F-54AA94CD57F4}"/>
-              </a:ext>
-            </a:extLst>
-          </p:cNvPr>
-          <p:cNvPicPr>
-            <a:picLocks noChangeAspect="1"/>
-          </p:cNvPicPr>
-          <p:nvPr/>
-        </p:nvPicPr>
-        <p:blipFill>
-          <a:blip r:embed="rId3">
-            <a:extLst>
-              <a:ext uri="{28A0092B-C50C-407E-A947-70E740481C1C}">
-                <a14:useLocalDpi xmlns:a14="http://schemas.microsoft.com/office/drawing/2010/main" val="0"/>
-              </a:ext>
-            </a:extLst>
-          </a:blip>
-          <a:srcRect/>
-          <a:stretch/>
-        </p:blipFill>
-        <p:spPr>
-          <a:xfrm>
-            <a:off x="6481974" y="347472"/>
-            <a:ext cx="5341315" cy="6163055"/>
-          </a:xfrm>
-          <a:prstGeom prst="rect">
-            <a:avLst/>
-          </a:prstGeom>
-        </p:spPr>
-      </p:pic>
-    </p:spTree>
-    <p:extLst>
-      <p:ext uri="{BB962C8B-B14F-4D97-AF65-F5344CB8AC3E}">
-        <p14:creationId xmlns:p14="http://schemas.microsoft.com/office/powerpoint/2010/main" val="3860751518"/>
       </p:ext>
     </p:extLst>
   </p:cSld>

</xml_diff>

<commit_message>
Added content to Lesson 2
</commit_message>
<xml_diff>
--- a/Resources/CarbGuide.pptx
+++ b/Resources/CarbGuide.pptx
@@ -7,15 +7,19 @@
   <p:sldIdLst>
     <p:sldId id="263" r:id="rId2"/>
     <p:sldId id="260" r:id="rId3"/>
-    <p:sldId id="259" r:id="rId4"/>
-    <p:sldId id="266" r:id="rId5"/>
-    <p:sldId id="256" r:id="rId6"/>
-    <p:sldId id="257" r:id="rId7"/>
-    <p:sldId id="258" r:id="rId8"/>
-    <p:sldId id="261" r:id="rId9"/>
-    <p:sldId id="262" r:id="rId10"/>
-    <p:sldId id="264" r:id="rId11"/>
-    <p:sldId id="265" r:id="rId12"/>
+    <p:sldId id="270" r:id="rId4"/>
+    <p:sldId id="259" r:id="rId5"/>
+    <p:sldId id="266" r:id="rId6"/>
+    <p:sldId id="256" r:id="rId7"/>
+    <p:sldId id="257" r:id="rId8"/>
+    <p:sldId id="267" r:id="rId9"/>
+    <p:sldId id="258" r:id="rId10"/>
+    <p:sldId id="269" r:id="rId11"/>
+    <p:sldId id="261" r:id="rId12"/>
+    <p:sldId id="262" r:id="rId13"/>
+    <p:sldId id="268" r:id="rId14"/>
+    <p:sldId id="264" r:id="rId15"/>
+    <p:sldId id="265" r:id="rId16"/>
   </p:sldIdLst>
   <p:sldSz cx="12192000" cy="6858000"/>
   <p:notesSz cx="6858000" cy="9144000"/>
@@ -121,13 +125,17 @@
           <p14:sldIdLst>
             <p14:sldId id="263"/>
             <p14:sldId id="260"/>
+            <p14:sldId id="270"/>
             <p14:sldId id="259"/>
             <p14:sldId id="266"/>
             <p14:sldId id="256"/>
             <p14:sldId id="257"/>
+            <p14:sldId id="267"/>
             <p14:sldId id="258"/>
+            <p14:sldId id="269"/>
             <p14:sldId id="261"/>
             <p14:sldId id="262"/>
+            <p14:sldId id="268"/>
             <p14:sldId id="264"/>
             <p14:sldId id="265"/>
           </p14:sldIdLst>
@@ -272,7 +280,7 @@
           <a:p>
             <a:fld id="{E9BF1F2D-2AEF-4074-BE6D-430396F80950}" type="datetimeFigureOut">
               <a:rPr lang="en-US" smtClean="0"/>
-              <a:t>4/20/2020</a:t>
+              <a:t>4/27/2020</a:t>
             </a:fld>
             <a:endParaRPr lang="en-US"/>
           </a:p>
@@ -442,7 +450,7 @@
           <a:p>
             <a:fld id="{E9BF1F2D-2AEF-4074-BE6D-430396F80950}" type="datetimeFigureOut">
               <a:rPr lang="en-US" smtClean="0"/>
-              <a:t>4/20/2020</a:t>
+              <a:t>4/27/2020</a:t>
             </a:fld>
             <a:endParaRPr lang="en-US"/>
           </a:p>
@@ -622,7 +630,7 @@
           <a:p>
             <a:fld id="{E9BF1F2D-2AEF-4074-BE6D-430396F80950}" type="datetimeFigureOut">
               <a:rPr lang="en-US" smtClean="0"/>
-              <a:t>4/20/2020</a:t>
+              <a:t>4/27/2020</a:t>
             </a:fld>
             <a:endParaRPr lang="en-US"/>
           </a:p>
@@ -792,7 +800,7 @@
           <a:p>
             <a:fld id="{E9BF1F2D-2AEF-4074-BE6D-430396F80950}" type="datetimeFigureOut">
               <a:rPr lang="en-US" smtClean="0"/>
-              <a:t>4/20/2020</a:t>
+              <a:t>4/27/2020</a:t>
             </a:fld>
             <a:endParaRPr lang="en-US"/>
           </a:p>
@@ -1036,7 +1044,7 @@
           <a:p>
             <a:fld id="{E9BF1F2D-2AEF-4074-BE6D-430396F80950}" type="datetimeFigureOut">
               <a:rPr lang="en-US" smtClean="0"/>
-              <a:t>4/20/2020</a:t>
+              <a:t>4/27/2020</a:t>
             </a:fld>
             <a:endParaRPr lang="en-US"/>
           </a:p>
@@ -1268,7 +1276,7 @@
           <a:p>
             <a:fld id="{E9BF1F2D-2AEF-4074-BE6D-430396F80950}" type="datetimeFigureOut">
               <a:rPr lang="en-US" smtClean="0"/>
-              <a:t>4/20/2020</a:t>
+              <a:t>4/27/2020</a:t>
             </a:fld>
             <a:endParaRPr lang="en-US"/>
           </a:p>
@@ -1635,7 +1643,7 @@
           <a:p>
             <a:fld id="{E9BF1F2D-2AEF-4074-BE6D-430396F80950}" type="datetimeFigureOut">
               <a:rPr lang="en-US" smtClean="0"/>
-              <a:t>4/20/2020</a:t>
+              <a:t>4/27/2020</a:t>
             </a:fld>
             <a:endParaRPr lang="en-US"/>
           </a:p>
@@ -1753,7 +1761,7 @@
           <a:p>
             <a:fld id="{E9BF1F2D-2AEF-4074-BE6D-430396F80950}" type="datetimeFigureOut">
               <a:rPr lang="en-US" smtClean="0"/>
-              <a:t>4/20/2020</a:t>
+              <a:t>4/27/2020</a:t>
             </a:fld>
             <a:endParaRPr lang="en-US"/>
           </a:p>
@@ -1848,7 +1856,7 @@
           <a:p>
             <a:fld id="{E9BF1F2D-2AEF-4074-BE6D-430396F80950}" type="datetimeFigureOut">
               <a:rPr lang="en-US" smtClean="0"/>
-              <a:t>4/20/2020</a:t>
+              <a:t>4/27/2020</a:t>
             </a:fld>
             <a:endParaRPr lang="en-US"/>
           </a:p>
@@ -2125,7 +2133,7 @@
           <a:p>
             <a:fld id="{E9BF1F2D-2AEF-4074-BE6D-430396F80950}" type="datetimeFigureOut">
               <a:rPr lang="en-US" smtClean="0"/>
-              <a:t>4/20/2020</a:t>
+              <a:t>4/27/2020</a:t>
             </a:fld>
             <a:endParaRPr lang="en-US"/>
           </a:p>
@@ -2382,7 +2390,7 @@
           <a:p>
             <a:fld id="{E9BF1F2D-2AEF-4074-BE6D-430396F80950}" type="datetimeFigureOut">
               <a:rPr lang="en-US" smtClean="0"/>
-              <a:t>4/20/2020</a:t>
+              <a:t>4/27/2020</a:t>
             </a:fld>
             <a:endParaRPr lang="en-US"/>
           </a:p>
@@ -2595,7 +2603,7 @@
           <a:p>
             <a:fld id="{E9BF1F2D-2AEF-4074-BE6D-430396F80950}" type="datetimeFigureOut">
               <a:rPr lang="en-US" smtClean="0"/>
-              <a:t>4/20/2020</a:t>
+              <a:t>4/27/2020</a:t>
             </a:fld>
             <a:endParaRPr lang="en-US"/>
           </a:p>
@@ -3092,6 +3100,406 @@
       </p:grpSpPr>
       <p:pic>
         <p:nvPicPr>
+          <p:cNvPr id="3" name="Picture 2" descr="Broccoli nutritional label: Serving size 1 slice., calories 15, total fat 0.2g (0%), saturated fat 0g, polyunsaturated fat 0g, monounsaturated fat 0g, total carbohydrates 3g (2%), dietary fiber 1.2g, sugars 0.8g, proteins 1.3g (0%)">
+            <a:extLst>
+              <a:ext uri="{FF2B5EF4-FFF2-40B4-BE49-F238E27FC236}">
+                <a16:creationId xmlns:a16="http://schemas.microsoft.com/office/drawing/2014/main" id="{2E274029-3CB9-4D3F-8CEB-63C4F6EA58A2}"/>
+              </a:ext>
+            </a:extLst>
+          </p:cNvPr>
+          <p:cNvPicPr>
+            <a:picLocks noChangeAspect="1"/>
+          </p:cNvPicPr>
+          <p:nvPr/>
+        </p:nvPicPr>
+        <p:blipFill>
+          <a:blip r:embed="rId2">
+            <a:extLst>
+              <a:ext uri="{28A0092B-C50C-407E-A947-70E740481C1C}">
+                <a14:useLocalDpi xmlns:a14="http://schemas.microsoft.com/office/drawing/2010/main" val="0"/>
+              </a:ext>
+            </a:extLst>
+          </a:blip>
+          <a:srcRect/>
+          <a:stretch/>
+        </p:blipFill>
+        <p:spPr>
+          <a:xfrm>
+            <a:off x="320040" y="988887"/>
+            <a:ext cx="5464456" cy="4880226"/>
+          </a:xfrm>
+          <a:prstGeom prst="rect">
+            <a:avLst/>
+          </a:prstGeom>
+        </p:spPr>
+      </p:pic>
+      <p:pic>
+        <p:nvPicPr>
+          <p:cNvPr id="9" name="Picture 8" descr="Broccoli food tracker showing 8% fat, 65% carbs, and 27% protein">
+            <a:extLst>
+              <a:ext uri="{FF2B5EF4-FFF2-40B4-BE49-F238E27FC236}">
+                <a16:creationId xmlns:a16="http://schemas.microsoft.com/office/drawing/2014/main" id="{1DD3E820-548F-49FD-9BC0-B37D771125A6}"/>
+              </a:ext>
+            </a:extLst>
+          </p:cNvPr>
+          <p:cNvPicPr>
+            <a:picLocks noChangeAspect="1"/>
+          </p:cNvPicPr>
+          <p:nvPr/>
+        </p:nvPicPr>
+        <p:blipFill>
+          <a:blip r:embed="rId3">
+            <a:extLst>
+              <a:ext uri="{28A0092B-C50C-407E-A947-70E740481C1C}">
+                <a14:useLocalDpi xmlns:a14="http://schemas.microsoft.com/office/drawing/2010/main" val="0"/>
+              </a:ext>
+            </a:extLst>
+          </a:blip>
+          <a:srcRect/>
+          <a:stretch/>
+        </p:blipFill>
+        <p:spPr>
+          <a:xfrm>
+            <a:off x="6504897" y="347472"/>
+            <a:ext cx="5341315" cy="6163055"/>
+          </a:xfrm>
+          <a:prstGeom prst="rect">
+            <a:avLst/>
+          </a:prstGeom>
+        </p:spPr>
+      </p:pic>
+    </p:spTree>
+    <p:extLst>
+      <p:ext uri="{BB962C8B-B14F-4D97-AF65-F5344CB8AC3E}">
+        <p14:creationId xmlns:p14="http://schemas.microsoft.com/office/powerpoint/2010/main" val="1206693330"/>
+      </p:ext>
+    </p:extLst>
+  </p:cSld>
+  <p:clrMapOvr>
+    <a:masterClrMapping/>
+  </p:clrMapOvr>
+</p:sld>
+</file>
+
+<file path=ppt/slides/slide11.xml><?xml version="1.0" encoding="utf-8"?>
+<p:sld xmlns:a="http://schemas.openxmlformats.org/drawingml/2006/main" xmlns:r="http://schemas.openxmlformats.org/officeDocument/2006/relationships" xmlns:p="http://schemas.openxmlformats.org/presentationml/2006/main">
+  <p:cSld>
+    <p:spTree>
+      <p:nvGrpSpPr>
+        <p:cNvPr id="1" name=""/>
+        <p:cNvGrpSpPr/>
+        <p:nvPr/>
+      </p:nvGrpSpPr>
+      <p:grpSpPr>
+        <a:xfrm>
+          <a:off x="0" y="0"/>
+          <a:ext cx="0" cy="0"/>
+          <a:chOff x="0" y="0"/>
+          <a:chExt cx="0" cy="0"/>
+        </a:xfrm>
+      </p:grpSpPr>
+      <p:pic>
+        <p:nvPicPr>
+          <p:cNvPr id="3" name="Picture 2" descr="Oats nutritional label: Serving size 1/2 cup., calories 150, total fat 2.5g (4%), saturated fat 0g, polyunsaturated fat 0g, monounsaturated fat 0g, total carbohydrates 27g (29%), dietary fiber 4g, sugars 1g, proteins 5g (3%)">
+            <a:extLst>
+              <a:ext uri="{FF2B5EF4-FFF2-40B4-BE49-F238E27FC236}">
+                <a16:creationId xmlns:a16="http://schemas.microsoft.com/office/drawing/2014/main" id="{7DA2B48C-E43C-4354-BAC5-EA0669D7D939}"/>
+              </a:ext>
+            </a:extLst>
+          </p:cNvPr>
+          <p:cNvPicPr>
+            <a:picLocks noChangeAspect="1"/>
+          </p:cNvPicPr>
+          <p:nvPr/>
+        </p:nvPicPr>
+        <p:blipFill>
+          <a:blip r:embed="rId2">
+            <a:extLst>
+              <a:ext uri="{28A0092B-C50C-407E-A947-70E740481C1C}">
+                <a14:useLocalDpi xmlns:a14="http://schemas.microsoft.com/office/drawing/2010/main" val="0"/>
+              </a:ext>
+            </a:extLst>
+          </a:blip>
+          <a:srcRect/>
+          <a:stretch/>
+        </p:blipFill>
+        <p:spPr>
+          <a:xfrm>
+            <a:off x="320040" y="988887"/>
+            <a:ext cx="5464456" cy="4880226"/>
+          </a:xfrm>
+          <a:prstGeom prst="rect">
+            <a:avLst/>
+          </a:prstGeom>
+        </p:spPr>
+      </p:pic>
+      <p:pic>
+        <p:nvPicPr>
+          <p:cNvPr id="9" name="Picture 8" descr="Oats food tracker showing 15% fat, 72% carbs, and 13% protein">
+            <a:extLst>
+              <a:ext uri="{FF2B5EF4-FFF2-40B4-BE49-F238E27FC236}">
+                <a16:creationId xmlns:a16="http://schemas.microsoft.com/office/drawing/2014/main" id="{6A7A7D94-B84B-4C72-B551-372AEDEBF27C}"/>
+              </a:ext>
+            </a:extLst>
+          </p:cNvPr>
+          <p:cNvPicPr>
+            <a:picLocks noChangeAspect="1"/>
+          </p:cNvPicPr>
+          <p:nvPr/>
+        </p:nvPicPr>
+        <p:blipFill>
+          <a:blip r:embed="rId3">
+            <a:extLst>
+              <a:ext uri="{28A0092B-C50C-407E-A947-70E740481C1C}">
+                <a14:useLocalDpi xmlns:a14="http://schemas.microsoft.com/office/drawing/2010/main" val="0"/>
+              </a:ext>
+            </a:extLst>
+          </a:blip>
+          <a:srcRect/>
+          <a:stretch/>
+        </p:blipFill>
+        <p:spPr>
+          <a:xfrm>
+            <a:off x="6487669" y="347472"/>
+            <a:ext cx="5341315" cy="6163055"/>
+          </a:xfrm>
+          <a:prstGeom prst="rect">
+            <a:avLst/>
+          </a:prstGeom>
+        </p:spPr>
+      </p:pic>
+    </p:spTree>
+    <p:extLst>
+      <p:ext uri="{BB962C8B-B14F-4D97-AF65-F5344CB8AC3E}">
+        <p14:creationId xmlns:p14="http://schemas.microsoft.com/office/powerpoint/2010/main" val="4029301395"/>
+      </p:ext>
+    </p:extLst>
+  </p:cSld>
+  <p:clrMapOvr>
+    <a:masterClrMapping/>
+  </p:clrMapOvr>
+</p:sld>
+</file>
+
+<file path=ppt/slides/slide12.xml><?xml version="1.0" encoding="utf-8"?>
+<p:sld xmlns:a="http://schemas.openxmlformats.org/drawingml/2006/main" xmlns:r="http://schemas.openxmlformats.org/officeDocument/2006/relationships" xmlns:p="http://schemas.openxmlformats.org/presentationml/2006/main">
+  <p:cSld>
+    <p:spTree>
+      <p:nvGrpSpPr>
+        <p:cNvPr id="1" name=""/>
+        <p:cNvGrpSpPr/>
+        <p:nvPr/>
+      </p:nvGrpSpPr>
+      <p:grpSpPr>
+        <a:xfrm>
+          <a:off x="0" y="0"/>
+          <a:ext cx="0" cy="0"/>
+          <a:chOff x="0" y="0"/>
+          <a:chExt cx="0" cy="0"/>
+        </a:xfrm>
+      </p:grpSpPr>
+      <p:pic>
+        <p:nvPicPr>
+          <p:cNvPr id="3" name="Picture 2" descr="Pasta nutritional label: Serving size 1 cup cooked., calories 220, total fat 1.5g (2%), saturated fat 0.2g, polyunsaturated fat 0.4g, monounsaturated fat 0.2g, total carbohydrates 43g (46%), dietary fiber 2.5g, sugars 0.8g, proteins 8g (5%)">
+            <a:extLst>
+              <a:ext uri="{FF2B5EF4-FFF2-40B4-BE49-F238E27FC236}">
+                <a16:creationId xmlns:a16="http://schemas.microsoft.com/office/drawing/2014/main" id="{5A7052CE-EF89-497E-A5CA-5BEC081A231F}"/>
+              </a:ext>
+            </a:extLst>
+          </p:cNvPr>
+          <p:cNvPicPr>
+            <a:picLocks noChangeAspect="1"/>
+          </p:cNvPicPr>
+          <p:nvPr/>
+        </p:nvPicPr>
+        <p:blipFill>
+          <a:blip r:embed="rId2">
+            <a:extLst>
+              <a:ext uri="{28A0092B-C50C-407E-A947-70E740481C1C}">
+                <a14:useLocalDpi xmlns:a14="http://schemas.microsoft.com/office/drawing/2010/main" val="0"/>
+              </a:ext>
+            </a:extLst>
+          </a:blip>
+          <a:srcRect/>
+          <a:stretch/>
+        </p:blipFill>
+        <p:spPr>
+          <a:xfrm>
+            <a:off x="320040" y="988887"/>
+            <a:ext cx="5464456" cy="4880226"/>
+          </a:xfrm>
+          <a:prstGeom prst="rect">
+            <a:avLst/>
+          </a:prstGeom>
+        </p:spPr>
+      </p:pic>
+      <p:pic>
+        <p:nvPicPr>
+          <p:cNvPr id="9" name="Picture 8" descr="Pasta food tracker showing 5% fat, 80% carbs, and 15% protein">
+            <a:extLst>
+              <a:ext uri="{FF2B5EF4-FFF2-40B4-BE49-F238E27FC236}">
+                <a16:creationId xmlns:a16="http://schemas.microsoft.com/office/drawing/2014/main" id="{AA421ED5-228F-4ACC-9C2F-54AA94CD57F4}"/>
+              </a:ext>
+            </a:extLst>
+          </p:cNvPr>
+          <p:cNvPicPr>
+            <a:picLocks noChangeAspect="1"/>
+          </p:cNvPicPr>
+          <p:nvPr/>
+        </p:nvPicPr>
+        <p:blipFill>
+          <a:blip r:embed="rId3">
+            <a:extLst>
+              <a:ext uri="{28A0092B-C50C-407E-A947-70E740481C1C}">
+                <a14:useLocalDpi xmlns:a14="http://schemas.microsoft.com/office/drawing/2010/main" val="0"/>
+              </a:ext>
+            </a:extLst>
+          </a:blip>
+          <a:srcRect/>
+          <a:stretch/>
+        </p:blipFill>
+        <p:spPr>
+          <a:xfrm>
+            <a:off x="6481974" y="347472"/>
+            <a:ext cx="5341315" cy="6163056"/>
+          </a:xfrm>
+          <a:prstGeom prst="rect">
+            <a:avLst/>
+          </a:prstGeom>
+        </p:spPr>
+      </p:pic>
+    </p:spTree>
+    <p:extLst>
+      <p:ext uri="{BB962C8B-B14F-4D97-AF65-F5344CB8AC3E}">
+        <p14:creationId xmlns:p14="http://schemas.microsoft.com/office/powerpoint/2010/main" val="1801791457"/>
+      </p:ext>
+    </p:extLst>
+  </p:cSld>
+  <p:clrMapOvr>
+    <a:masterClrMapping/>
+  </p:clrMapOvr>
+</p:sld>
+</file>
+
+<file path=ppt/slides/slide13.xml><?xml version="1.0" encoding="utf-8"?>
+<p:sld xmlns:a="http://schemas.openxmlformats.org/drawingml/2006/main" xmlns:r="http://schemas.openxmlformats.org/officeDocument/2006/relationships" xmlns:p="http://schemas.openxmlformats.org/presentationml/2006/main">
+  <p:cSld>
+    <p:spTree>
+      <p:nvGrpSpPr>
+        <p:cNvPr id="1" name=""/>
+        <p:cNvGrpSpPr/>
+        <p:nvPr/>
+      </p:nvGrpSpPr>
+      <p:grpSpPr>
+        <a:xfrm>
+          <a:off x="0" y="0"/>
+          <a:ext cx="0" cy="0"/>
+          <a:chOff x="0" y="0"/>
+          <a:chExt cx="0" cy="0"/>
+        </a:xfrm>
+      </p:grpSpPr>
+      <p:pic>
+        <p:nvPicPr>
+          <p:cNvPr id="3" name="Picture 2" descr="Quinoa nutritional label: Serving size 1/3 cup cooked., calories 206, total fat 3.4g (8%), saturated fat 0.4g, polyunsaturated fat 1.8g, monounsaturated fat 0.9g, total carbohydrates 36g (27%), dietary fiber 3.9g, sugars 0g, proteins 8g (5%)">
+            <a:extLst>
+              <a:ext uri="{FF2B5EF4-FFF2-40B4-BE49-F238E27FC236}">
+                <a16:creationId xmlns:a16="http://schemas.microsoft.com/office/drawing/2014/main" id="{5A7052CE-EF89-497E-A5CA-5BEC081A231F}"/>
+              </a:ext>
+            </a:extLst>
+          </p:cNvPr>
+          <p:cNvPicPr>
+            <a:picLocks noChangeAspect="1"/>
+          </p:cNvPicPr>
+          <p:nvPr/>
+        </p:nvPicPr>
+        <p:blipFill>
+          <a:blip r:embed="rId2">
+            <a:extLst>
+              <a:ext uri="{28A0092B-C50C-407E-A947-70E740481C1C}">
+                <a14:useLocalDpi xmlns:a14="http://schemas.microsoft.com/office/drawing/2010/main" val="0"/>
+              </a:ext>
+            </a:extLst>
+          </a:blip>
+          <a:srcRect/>
+          <a:stretch/>
+        </p:blipFill>
+        <p:spPr>
+          <a:xfrm>
+            <a:off x="320040" y="988887"/>
+            <a:ext cx="5464456" cy="4880226"/>
+          </a:xfrm>
+          <a:prstGeom prst="rect">
+            <a:avLst/>
+          </a:prstGeom>
+        </p:spPr>
+      </p:pic>
+      <p:pic>
+        <p:nvPicPr>
+          <p:cNvPr id="9" name="Picture 8" descr="Quinoa food tracker showing 15% fat, 70% carbs, and 15% protein">
+            <a:extLst>
+              <a:ext uri="{FF2B5EF4-FFF2-40B4-BE49-F238E27FC236}">
+                <a16:creationId xmlns:a16="http://schemas.microsoft.com/office/drawing/2014/main" id="{AA421ED5-228F-4ACC-9C2F-54AA94CD57F4}"/>
+              </a:ext>
+            </a:extLst>
+          </p:cNvPr>
+          <p:cNvPicPr>
+            <a:picLocks noChangeAspect="1"/>
+          </p:cNvPicPr>
+          <p:nvPr/>
+        </p:nvPicPr>
+        <p:blipFill>
+          <a:blip r:embed="rId3">
+            <a:extLst>
+              <a:ext uri="{28A0092B-C50C-407E-A947-70E740481C1C}">
+                <a14:useLocalDpi xmlns:a14="http://schemas.microsoft.com/office/drawing/2010/main" val="0"/>
+              </a:ext>
+            </a:extLst>
+          </a:blip>
+          <a:srcRect/>
+          <a:stretch/>
+        </p:blipFill>
+        <p:spPr>
+          <a:xfrm>
+            <a:off x="6481974" y="347472"/>
+            <a:ext cx="5341315" cy="6163055"/>
+          </a:xfrm>
+          <a:prstGeom prst="rect">
+            <a:avLst/>
+          </a:prstGeom>
+        </p:spPr>
+      </p:pic>
+    </p:spTree>
+    <p:extLst>
+      <p:ext uri="{BB962C8B-B14F-4D97-AF65-F5344CB8AC3E}">
+        <p14:creationId xmlns:p14="http://schemas.microsoft.com/office/powerpoint/2010/main" val="3090417835"/>
+      </p:ext>
+    </p:extLst>
+  </p:cSld>
+  <p:clrMapOvr>
+    <a:masterClrMapping/>
+  </p:clrMapOvr>
+</p:sld>
+</file>
+
+<file path=ppt/slides/slide14.xml><?xml version="1.0" encoding="utf-8"?>
+<p:sld xmlns:a="http://schemas.openxmlformats.org/drawingml/2006/main" xmlns:r="http://schemas.openxmlformats.org/officeDocument/2006/relationships" xmlns:p="http://schemas.openxmlformats.org/presentationml/2006/main">
+  <p:cSld>
+    <p:spTree>
+      <p:nvGrpSpPr>
+        <p:cNvPr id="1" name=""/>
+        <p:cNvGrpSpPr/>
+        <p:nvPr/>
+      </p:nvGrpSpPr>
+      <p:grpSpPr>
+        <a:xfrm>
+          <a:off x="0" y="0"/>
+          <a:ext cx="0" cy="0"/>
+          <a:chOff x="0" y="0"/>
+          <a:chExt cx="0" cy="0"/>
+        </a:xfrm>
+      </p:grpSpPr>
+      <p:pic>
+        <p:nvPicPr>
           <p:cNvPr id="3" name="Picture 2" descr="Spinach nutritional label: Serving size 1 cup., calories 7, total fat 0g (0%), saturated fat 0g, polyunsaturated fat 0g, monounsaturated fat 0g, total carbohydrates 1g (1%), dietary fiber 0.7g, sugars 0.1g, proteins 0.7g (0%)">
             <a:extLst>
               <a:ext uri="{FF2B5EF4-FFF2-40B4-BE49-F238E27FC236}">
@@ -3173,7 +3581,7 @@
 </p:sld>
 </file>
 
-<file path=ppt/slides/slide11.xml><?xml version="1.0" encoding="utf-8"?>
+<file path=ppt/slides/slide15.xml><?xml version="1.0" encoding="utf-8"?>
 <p:sld xmlns:a="http://schemas.openxmlformats.org/drawingml/2006/main" xmlns:r="http://schemas.openxmlformats.org/officeDocument/2006/relationships" xmlns:p="http://schemas.openxmlformats.org/presentationml/2006/main">
   <p:cSld>
     <p:spTree>
@@ -3392,10 +3800,10 @@
       </p:grpSpPr>
       <p:pic>
         <p:nvPicPr>
-          <p:cNvPr id="3" name="Picture 2" descr="Baby carrots nutritional label: Serving size 3 oz (85g)., calories 35, total fat 0g (0%), saturated fat 0g, polyunsaturated fat 0g, monounsaturated fat 0g, total carbohydrates 8g (9%), dietary fiber 2g, sugars 5g, proteins 1g (0%)">
+          <p:cNvPr id="3" name="Picture 2" descr="Asparagus nutritional label: Serving size 5 spears., calories 16, total fat 0.1g (-%), saturated fat 0g, polyunsaturated fat 0g, monounsaturated fat 0g, total carbohydrates 3.1g (3%), dietary fiber 1.7g, sugars 1.5g, proteins 1.8g (1%)">
             <a:extLst>
               <a:ext uri="{FF2B5EF4-FFF2-40B4-BE49-F238E27FC236}">
-                <a16:creationId xmlns:a16="http://schemas.microsoft.com/office/drawing/2014/main" id="{D4094881-8A73-4191-88C5-AE902DAF078D}"/>
+                <a16:creationId xmlns:a16="http://schemas.microsoft.com/office/drawing/2014/main" id="{8F732D9E-B16A-4CE0-83A2-74102A49EDF9}"/>
               </a:ext>
             </a:extLst>
           </p:cNvPr>
@@ -3427,10 +3835,10 @@
       </p:pic>
       <p:pic>
         <p:nvPicPr>
-          <p:cNvPr id="9" name="Picture 8" descr="Baby carrots food tracker showing 0% fat, 89% carbs, and 11% protein">
+          <p:cNvPr id="9" name="Picture 8" descr="Asparagus food tracker showing 4% fat, 61% carbs, and 35% protein">
             <a:extLst>
               <a:ext uri="{FF2B5EF4-FFF2-40B4-BE49-F238E27FC236}">
-                <a16:creationId xmlns:a16="http://schemas.microsoft.com/office/drawing/2014/main" id="{0E8E4F9C-C06E-4F2A-8A32-0ECA26EDE1D5}"/>
+                <a16:creationId xmlns:a16="http://schemas.microsoft.com/office/drawing/2014/main" id="{A3B83438-F7D5-46F7-84C0-5BD830BB4C3B}"/>
               </a:ext>
             </a:extLst>
           </p:cNvPr>
@@ -3452,8 +3860,8 @@
         </p:blipFill>
         <p:spPr>
           <a:xfrm>
-            <a:off x="6522343" y="347472"/>
-            <a:ext cx="5341315" cy="6163056"/>
+            <a:off x="6476302" y="347472"/>
+            <a:ext cx="5341315" cy="6163055"/>
           </a:xfrm>
           <a:prstGeom prst="rect">
             <a:avLst/>
@@ -3463,7 +3871,7 @@
     </p:spTree>
     <p:extLst>
       <p:ext uri="{BB962C8B-B14F-4D97-AF65-F5344CB8AC3E}">
-        <p14:creationId xmlns:p14="http://schemas.microsoft.com/office/powerpoint/2010/main" val="90669892"/>
+        <p14:creationId xmlns:p14="http://schemas.microsoft.com/office/powerpoint/2010/main" val="3719573987"/>
       </p:ext>
     </p:extLst>
   </p:cSld>
@@ -3492,6 +3900,106 @@
       </p:grpSpPr>
       <p:pic>
         <p:nvPicPr>
+          <p:cNvPr id="3" name="Picture 2" descr="Baby carrots nutritional label: Serving size 3 oz (85g)., calories 35, total fat 0g (0%), saturated fat 0g, polyunsaturated fat 0g, monounsaturated fat 0g, total carbohydrates 8g (9%), dietary fiber 2g, sugars 5g, proteins 1g (0%)">
+            <a:extLst>
+              <a:ext uri="{FF2B5EF4-FFF2-40B4-BE49-F238E27FC236}">
+                <a16:creationId xmlns:a16="http://schemas.microsoft.com/office/drawing/2014/main" id="{D4094881-8A73-4191-88C5-AE902DAF078D}"/>
+              </a:ext>
+            </a:extLst>
+          </p:cNvPr>
+          <p:cNvPicPr>
+            <a:picLocks noChangeAspect="1"/>
+          </p:cNvPicPr>
+          <p:nvPr/>
+        </p:nvPicPr>
+        <p:blipFill>
+          <a:blip r:embed="rId2">
+            <a:extLst>
+              <a:ext uri="{28A0092B-C50C-407E-A947-70E740481C1C}">
+                <a14:useLocalDpi xmlns:a14="http://schemas.microsoft.com/office/drawing/2010/main" val="0"/>
+              </a:ext>
+            </a:extLst>
+          </a:blip>
+          <a:srcRect/>
+          <a:stretch/>
+        </p:blipFill>
+        <p:spPr>
+          <a:xfrm>
+            <a:off x="320040" y="988887"/>
+            <a:ext cx="5464456" cy="4880226"/>
+          </a:xfrm>
+          <a:prstGeom prst="rect">
+            <a:avLst/>
+          </a:prstGeom>
+        </p:spPr>
+      </p:pic>
+      <p:pic>
+        <p:nvPicPr>
+          <p:cNvPr id="9" name="Picture 8" descr="Baby carrots food tracker showing 0% fat, 89% carbs, and 11% protein">
+            <a:extLst>
+              <a:ext uri="{FF2B5EF4-FFF2-40B4-BE49-F238E27FC236}">
+                <a16:creationId xmlns:a16="http://schemas.microsoft.com/office/drawing/2014/main" id="{0E8E4F9C-C06E-4F2A-8A32-0ECA26EDE1D5}"/>
+              </a:ext>
+            </a:extLst>
+          </p:cNvPr>
+          <p:cNvPicPr>
+            <a:picLocks noChangeAspect="1"/>
+          </p:cNvPicPr>
+          <p:nvPr/>
+        </p:nvPicPr>
+        <p:blipFill>
+          <a:blip r:embed="rId3">
+            <a:extLst>
+              <a:ext uri="{28A0092B-C50C-407E-A947-70E740481C1C}">
+                <a14:useLocalDpi xmlns:a14="http://schemas.microsoft.com/office/drawing/2010/main" val="0"/>
+              </a:ext>
+            </a:extLst>
+          </a:blip>
+          <a:srcRect/>
+          <a:stretch/>
+        </p:blipFill>
+        <p:spPr>
+          <a:xfrm>
+            <a:off x="6522343" y="347472"/>
+            <a:ext cx="5341315" cy="6163056"/>
+          </a:xfrm>
+          <a:prstGeom prst="rect">
+            <a:avLst/>
+          </a:prstGeom>
+        </p:spPr>
+      </p:pic>
+    </p:spTree>
+    <p:extLst>
+      <p:ext uri="{BB962C8B-B14F-4D97-AF65-F5344CB8AC3E}">
+        <p14:creationId xmlns:p14="http://schemas.microsoft.com/office/powerpoint/2010/main" val="90669892"/>
+      </p:ext>
+    </p:extLst>
+  </p:cSld>
+  <p:clrMapOvr>
+    <a:masterClrMapping/>
+  </p:clrMapOvr>
+</p:sld>
+</file>
+
+<file path=ppt/slides/slide5.xml><?xml version="1.0" encoding="utf-8"?>
+<p:sld xmlns:a="http://schemas.openxmlformats.org/drawingml/2006/main" xmlns:r="http://schemas.openxmlformats.org/officeDocument/2006/relationships" xmlns:p="http://schemas.openxmlformats.org/presentationml/2006/main">
+  <p:cSld>
+    <p:spTree>
+      <p:nvGrpSpPr>
+        <p:cNvPr id="1" name=""/>
+        <p:cNvGrpSpPr/>
+        <p:nvPr/>
+      </p:nvGrpSpPr>
+      <p:grpSpPr>
+        <a:xfrm>
+          <a:off x="0" y="0"/>
+          <a:ext cx="0" cy="0"/>
+          <a:chOff x="0" y="0"/>
+          <a:chExt cx="0" cy="0"/>
+        </a:xfrm>
+      </p:grpSpPr>
+      <p:pic>
+        <p:nvPicPr>
           <p:cNvPr id="3" name="Picture 2" descr="Baked sweet potato nutritional label: Serving size 1 medium., calories 112, total fat 0g (0%), saturated fat 0g, polyunsaturated fat 0g, monounsaturated fat 0g, total carbohydrates 26g (28%), dietary fiber 4g, sugars 5g, proteins 2g (1%)">
             <a:extLst>
               <a:ext uri="{FF2B5EF4-FFF2-40B4-BE49-F238E27FC236}">
@@ -3573,7 +4081,7 @@
 </p:sld>
 </file>
 
-<file path=ppt/slides/slide5.xml><?xml version="1.0" encoding="utf-8"?>
+<file path=ppt/slides/slide6.xml><?xml version="1.0" encoding="utf-8"?>
 <p:sld xmlns:a="http://schemas.openxmlformats.org/drawingml/2006/main" xmlns:r="http://schemas.openxmlformats.org/officeDocument/2006/relationships" xmlns:p="http://schemas.openxmlformats.org/presentationml/2006/main">
   <p:cSld>
     <p:bg>
@@ -3672,106 +4180,6 @@
     <p:extLst>
       <p:ext uri="{BB962C8B-B14F-4D97-AF65-F5344CB8AC3E}">
         <p14:creationId xmlns:p14="http://schemas.microsoft.com/office/powerpoint/2010/main" val="2579344568"/>
-      </p:ext>
-    </p:extLst>
-  </p:cSld>
-  <p:clrMapOvr>
-    <a:masterClrMapping/>
-  </p:clrMapOvr>
-</p:sld>
-</file>
-
-<file path=ppt/slides/slide6.xml><?xml version="1.0" encoding="utf-8"?>
-<p:sld xmlns:a="http://schemas.openxmlformats.org/drawingml/2006/main" xmlns:r="http://schemas.openxmlformats.org/officeDocument/2006/relationships" xmlns:p="http://schemas.openxmlformats.org/presentationml/2006/main">
-  <p:cSld>
-    <p:spTree>
-      <p:nvGrpSpPr>
-        <p:cNvPr id="1" name=""/>
-        <p:cNvGrpSpPr/>
-        <p:nvPr/>
-      </p:nvGrpSpPr>
-      <p:grpSpPr>
-        <a:xfrm>
-          <a:off x="0" y="0"/>
-          <a:ext cx="0" cy="0"/>
-          <a:chOff x="0" y="0"/>
-          <a:chExt cx="0" cy="0"/>
-        </a:xfrm>
-      </p:grpSpPr>
-      <p:pic>
-        <p:nvPicPr>
-          <p:cNvPr id="3" name="Picture 2" descr="Black beans nutritional label: Serving size 1/2 cup., calories 312, total fat 0.8g (1%), saturated fat 0.2g, polyunsaturated fat 0.4g, monounsaturated fat 0.1g, total carbohydrates 58g (62%), dietary fiber 14g, sugars 2g, proteins 20g (13%)">
-            <a:extLst>
-              <a:ext uri="{FF2B5EF4-FFF2-40B4-BE49-F238E27FC236}">
-                <a16:creationId xmlns:a16="http://schemas.microsoft.com/office/drawing/2014/main" id="{93541BCE-4AB7-487E-B562-B4EABBC61213}"/>
-              </a:ext>
-            </a:extLst>
-          </p:cNvPr>
-          <p:cNvPicPr>
-            <a:picLocks noChangeAspect="1"/>
-          </p:cNvPicPr>
-          <p:nvPr/>
-        </p:nvPicPr>
-        <p:blipFill>
-          <a:blip r:embed="rId2">
-            <a:extLst>
-              <a:ext uri="{28A0092B-C50C-407E-A947-70E740481C1C}">
-                <a14:useLocalDpi xmlns:a14="http://schemas.microsoft.com/office/drawing/2010/main" val="0"/>
-              </a:ext>
-            </a:extLst>
-          </a:blip>
-          <a:srcRect/>
-          <a:stretch/>
-        </p:blipFill>
-        <p:spPr>
-          <a:xfrm>
-            <a:off x="320040" y="988887"/>
-            <a:ext cx="5464456" cy="4880226"/>
-          </a:xfrm>
-          <a:prstGeom prst="rect">
-            <a:avLst/>
-          </a:prstGeom>
-        </p:spPr>
-      </p:pic>
-      <p:pic>
-        <p:nvPicPr>
-          <p:cNvPr id="9" name="Picture 8" descr="Black beans food tracker showing 2% fat, 25% carbs, and 92% protein">
-            <a:extLst>
-              <a:ext uri="{FF2B5EF4-FFF2-40B4-BE49-F238E27FC236}">
-                <a16:creationId xmlns:a16="http://schemas.microsoft.com/office/drawing/2014/main" id="{FCB3D9A8-54CC-480B-8007-8FB9D6DD3A52}"/>
-              </a:ext>
-            </a:extLst>
-          </p:cNvPr>
-          <p:cNvPicPr>
-            <a:picLocks noChangeAspect="1"/>
-          </p:cNvPicPr>
-          <p:nvPr/>
-        </p:nvPicPr>
-        <p:blipFill>
-          <a:blip r:embed="rId3">
-            <a:extLst>
-              <a:ext uri="{28A0092B-C50C-407E-A947-70E740481C1C}">
-                <a14:useLocalDpi xmlns:a14="http://schemas.microsoft.com/office/drawing/2010/main" val="0"/>
-              </a:ext>
-            </a:extLst>
-          </a:blip>
-          <a:srcRect/>
-          <a:stretch/>
-        </p:blipFill>
-        <p:spPr>
-          <a:xfrm>
-            <a:off x="6470617" y="349250"/>
-            <a:ext cx="5338233" cy="6159500"/>
-          </a:xfrm>
-          <a:prstGeom prst="rect">
-            <a:avLst/>
-          </a:prstGeom>
-        </p:spPr>
-      </p:pic>
-    </p:spTree>
-    <p:extLst>
-      <p:ext uri="{BB962C8B-B14F-4D97-AF65-F5344CB8AC3E}">
-        <p14:creationId xmlns:p14="http://schemas.microsoft.com/office/powerpoint/2010/main" val="337296009"/>
       </p:ext>
     </p:extLst>
   </p:cSld>
@@ -3800,10 +4208,10 @@
       </p:grpSpPr>
       <p:pic>
         <p:nvPicPr>
-          <p:cNvPr id="3" name="Picture 2" descr="Bread nutritional label: Serving size 1 slice., calories 110, total fat 2g (3%), saturated fat 0g, polyunsaturated fat 0g, monounsaturated fat 0g, total carbohydrates 20g (21%), dietary fiber 5g, sugars 4g, proteins 5g (3%)">
+          <p:cNvPr id="3" name="Picture 2" descr="Black beans nutritional label: Serving size 1/2 cup., calories 312, total fat 0.8g (1%), saturated fat 0.2g, polyunsaturated fat 0.4g, monounsaturated fat 0.1g, total carbohydrates 58g (62%), dietary fiber 14g, sugars 2g, proteins 20g (13%)">
             <a:extLst>
               <a:ext uri="{FF2B5EF4-FFF2-40B4-BE49-F238E27FC236}">
-                <a16:creationId xmlns:a16="http://schemas.microsoft.com/office/drawing/2014/main" id="{2E274029-3CB9-4D3F-8CEB-63C4F6EA58A2}"/>
+                <a16:creationId xmlns:a16="http://schemas.microsoft.com/office/drawing/2014/main" id="{93541BCE-4AB7-487E-B562-B4EABBC61213}"/>
               </a:ext>
             </a:extLst>
           </p:cNvPr>
@@ -3835,10 +4243,10 @@
       </p:pic>
       <p:pic>
         <p:nvPicPr>
-          <p:cNvPr id="9" name="Picture 8" descr="Bread food tracker showing 15% fat, 68% carbs, and 17% protein">
+          <p:cNvPr id="9" name="Picture 8" descr="Black beans food tracker showing 2% fat, 25% carbs, and 92% protein">
             <a:extLst>
               <a:ext uri="{FF2B5EF4-FFF2-40B4-BE49-F238E27FC236}">
-                <a16:creationId xmlns:a16="http://schemas.microsoft.com/office/drawing/2014/main" id="{1DD3E820-548F-49FD-9BC0-B37D771125A6}"/>
+                <a16:creationId xmlns:a16="http://schemas.microsoft.com/office/drawing/2014/main" id="{FCB3D9A8-54CC-480B-8007-8FB9D6DD3A52}"/>
               </a:ext>
             </a:extLst>
           </p:cNvPr>
@@ -3860,8 +4268,8 @@
         </p:blipFill>
         <p:spPr>
           <a:xfrm>
-            <a:off x="6504897" y="347472"/>
-            <a:ext cx="5341315" cy="6163056"/>
+            <a:off x="6470617" y="349250"/>
+            <a:ext cx="5338233" cy="6159500"/>
           </a:xfrm>
           <a:prstGeom prst="rect">
             <a:avLst/>
@@ -3871,7 +4279,7 @@
     </p:spTree>
     <p:extLst>
       <p:ext uri="{BB962C8B-B14F-4D97-AF65-F5344CB8AC3E}">
-        <p14:creationId xmlns:p14="http://schemas.microsoft.com/office/powerpoint/2010/main" val="43115084"/>
+        <p14:creationId xmlns:p14="http://schemas.microsoft.com/office/powerpoint/2010/main" val="337296009"/>
       </p:ext>
     </p:extLst>
   </p:cSld>
@@ -3900,10 +4308,10 @@
       </p:grpSpPr>
       <p:pic>
         <p:nvPicPr>
-          <p:cNvPr id="3" name="Picture 2" descr="Oats nutritional label: Serving size 1/2 cup., calories 150, total fat 2.5g (4%), saturated fat 0g, polyunsaturated fat 0g, monounsaturated fat 0g, total carbohydrates 27g (29%), dietary fiber 4g, sugars 1g, proteins 5g (3%)">
+          <p:cNvPr id="3" name="Picture 2" descr="Blueberries nutritional label: Serving size 1/2 cup., calories 42, total fat 0.2g (0%), saturated fat 0g, polyunsaturated fat 0g, monounsaturated fat 0g, total carbohydrates 10.7g (8%), dietary fiber 1.8g, sugars 7.4g, proteins 0.5g (0%)">
             <a:extLst>
               <a:ext uri="{FF2B5EF4-FFF2-40B4-BE49-F238E27FC236}">
-                <a16:creationId xmlns:a16="http://schemas.microsoft.com/office/drawing/2014/main" id="{7DA2B48C-E43C-4354-BAC5-EA0669D7D939}"/>
+                <a16:creationId xmlns:a16="http://schemas.microsoft.com/office/drawing/2014/main" id="{93541BCE-4AB7-487E-B562-B4EABBC61213}"/>
               </a:ext>
             </a:extLst>
           </p:cNvPr>
@@ -3935,10 +4343,10 @@
       </p:pic>
       <p:pic>
         <p:nvPicPr>
-          <p:cNvPr id="9" name="Picture 8" descr="Oats food tracker showing 15% fat, 72% carbs, and 13% protein">
+          <p:cNvPr id="9" name="Picture 8" descr="Blueberries food tracker showing 4% fat, 91% carbs, and 5% protein">
             <a:extLst>
               <a:ext uri="{FF2B5EF4-FFF2-40B4-BE49-F238E27FC236}">
-                <a16:creationId xmlns:a16="http://schemas.microsoft.com/office/drawing/2014/main" id="{6A7A7D94-B84B-4C72-B551-372AEDEBF27C}"/>
+                <a16:creationId xmlns:a16="http://schemas.microsoft.com/office/drawing/2014/main" id="{FCB3D9A8-54CC-480B-8007-8FB9D6DD3A52}"/>
               </a:ext>
             </a:extLst>
           </p:cNvPr>
@@ -3960,8 +4368,8 @@
         </p:blipFill>
         <p:spPr>
           <a:xfrm>
-            <a:off x="6487669" y="347472"/>
-            <a:ext cx="5341315" cy="6163055"/>
+            <a:off x="6416268" y="349250"/>
+            <a:ext cx="5338233" cy="6159498"/>
           </a:xfrm>
           <a:prstGeom prst="rect">
             <a:avLst/>
@@ -3971,7 +4379,7 @@
     </p:spTree>
     <p:extLst>
       <p:ext uri="{BB962C8B-B14F-4D97-AF65-F5344CB8AC3E}">
-        <p14:creationId xmlns:p14="http://schemas.microsoft.com/office/powerpoint/2010/main" val="4029301395"/>
+        <p14:creationId xmlns:p14="http://schemas.microsoft.com/office/powerpoint/2010/main" val="2204941250"/>
       </p:ext>
     </p:extLst>
   </p:cSld>
@@ -4000,10 +4408,10 @@
       </p:grpSpPr>
       <p:pic>
         <p:nvPicPr>
-          <p:cNvPr id="3" name="Picture 2" descr="Pasta nutritional label: Serving size 1 cup cooked., calories 220, total fat 1.5g (2%), saturated fat 0.2g, polyunsaturated fat 0.4g, monounsaturated fat 0.2g, total carbohydrates 43g (46%), dietary fiber 2.5g, sugars 0.8g, proteins 8g (5%)">
+          <p:cNvPr id="3" name="Picture 2" descr="Bread nutritional label: Serving size 1 slice., calories 110, total fat 2g (3%), saturated fat 0g, polyunsaturated fat 0g, monounsaturated fat 0g, total carbohydrates 20g (21%), dietary fiber 5g, sugars 4g, proteins 5g (3%)">
             <a:extLst>
               <a:ext uri="{FF2B5EF4-FFF2-40B4-BE49-F238E27FC236}">
-                <a16:creationId xmlns:a16="http://schemas.microsoft.com/office/drawing/2014/main" id="{5A7052CE-EF89-497E-A5CA-5BEC081A231F}"/>
+                <a16:creationId xmlns:a16="http://schemas.microsoft.com/office/drawing/2014/main" id="{2E274029-3CB9-4D3F-8CEB-63C4F6EA58A2}"/>
               </a:ext>
             </a:extLst>
           </p:cNvPr>
@@ -4035,10 +4443,10 @@
       </p:pic>
       <p:pic>
         <p:nvPicPr>
-          <p:cNvPr id="9" name="Picture 8" descr="Pasta food tracker showing 5% fat, 80% carbs, and 15% protein">
+          <p:cNvPr id="9" name="Picture 8" descr="Bread food tracker showing 15% fat, 68% carbs, and 17% protein">
             <a:extLst>
               <a:ext uri="{FF2B5EF4-FFF2-40B4-BE49-F238E27FC236}">
-                <a16:creationId xmlns:a16="http://schemas.microsoft.com/office/drawing/2014/main" id="{AA421ED5-228F-4ACC-9C2F-54AA94CD57F4}"/>
+                <a16:creationId xmlns:a16="http://schemas.microsoft.com/office/drawing/2014/main" id="{1DD3E820-548F-49FD-9BC0-B37D771125A6}"/>
               </a:ext>
             </a:extLst>
           </p:cNvPr>
@@ -4060,7 +4468,7 @@
         </p:blipFill>
         <p:spPr>
           <a:xfrm>
-            <a:off x="6481974" y="347472"/>
+            <a:off x="6504897" y="347472"/>
             <a:ext cx="5341315" cy="6163056"/>
           </a:xfrm>
           <a:prstGeom prst="rect">
@@ -4071,7 +4479,7 @@
     </p:spTree>
     <p:extLst>
       <p:ext uri="{BB962C8B-B14F-4D97-AF65-F5344CB8AC3E}">
-        <p14:creationId xmlns:p14="http://schemas.microsoft.com/office/powerpoint/2010/main" val="1801791457"/>
+        <p14:creationId xmlns:p14="http://schemas.microsoft.com/office/powerpoint/2010/main" val="43115084"/>
       </p:ext>
     </p:extLst>
   </p:cSld>

</xml_diff>

<commit_message>
Tweaks after user testing.
</commit_message>
<xml_diff>
--- a/Resources/CarbGuide.pptx
+++ b/Resources/CarbGuide.pptx
@@ -280,7 +280,7 @@
           <a:p>
             <a:fld id="{E9BF1F2D-2AEF-4074-BE6D-430396F80950}" type="datetimeFigureOut">
               <a:rPr lang="en-US" smtClean="0"/>
-              <a:t>4/27/2020</a:t>
+              <a:t>5/2/2020</a:t>
             </a:fld>
             <a:endParaRPr lang="en-US"/>
           </a:p>
@@ -450,7 +450,7 @@
           <a:p>
             <a:fld id="{E9BF1F2D-2AEF-4074-BE6D-430396F80950}" type="datetimeFigureOut">
               <a:rPr lang="en-US" smtClean="0"/>
-              <a:t>4/27/2020</a:t>
+              <a:t>5/2/2020</a:t>
             </a:fld>
             <a:endParaRPr lang="en-US"/>
           </a:p>
@@ -630,7 +630,7 @@
           <a:p>
             <a:fld id="{E9BF1F2D-2AEF-4074-BE6D-430396F80950}" type="datetimeFigureOut">
               <a:rPr lang="en-US" smtClean="0"/>
-              <a:t>4/27/2020</a:t>
+              <a:t>5/2/2020</a:t>
             </a:fld>
             <a:endParaRPr lang="en-US"/>
           </a:p>
@@ -800,7 +800,7 @@
           <a:p>
             <a:fld id="{E9BF1F2D-2AEF-4074-BE6D-430396F80950}" type="datetimeFigureOut">
               <a:rPr lang="en-US" smtClean="0"/>
-              <a:t>4/27/2020</a:t>
+              <a:t>5/2/2020</a:t>
             </a:fld>
             <a:endParaRPr lang="en-US"/>
           </a:p>
@@ -1044,7 +1044,7 @@
           <a:p>
             <a:fld id="{E9BF1F2D-2AEF-4074-BE6D-430396F80950}" type="datetimeFigureOut">
               <a:rPr lang="en-US" smtClean="0"/>
-              <a:t>4/27/2020</a:t>
+              <a:t>5/2/2020</a:t>
             </a:fld>
             <a:endParaRPr lang="en-US"/>
           </a:p>
@@ -1276,7 +1276,7 @@
           <a:p>
             <a:fld id="{E9BF1F2D-2AEF-4074-BE6D-430396F80950}" type="datetimeFigureOut">
               <a:rPr lang="en-US" smtClean="0"/>
-              <a:t>4/27/2020</a:t>
+              <a:t>5/2/2020</a:t>
             </a:fld>
             <a:endParaRPr lang="en-US"/>
           </a:p>
@@ -1643,7 +1643,7 @@
           <a:p>
             <a:fld id="{E9BF1F2D-2AEF-4074-BE6D-430396F80950}" type="datetimeFigureOut">
               <a:rPr lang="en-US" smtClean="0"/>
-              <a:t>4/27/2020</a:t>
+              <a:t>5/2/2020</a:t>
             </a:fld>
             <a:endParaRPr lang="en-US"/>
           </a:p>
@@ -1761,7 +1761,7 @@
           <a:p>
             <a:fld id="{E9BF1F2D-2AEF-4074-BE6D-430396F80950}" type="datetimeFigureOut">
               <a:rPr lang="en-US" smtClean="0"/>
-              <a:t>4/27/2020</a:t>
+              <a:t>5/2/2020</a:t>
             </a:fld>
             <a:endParaRPr lang="en-US"/>
           </a:p>
@@ -1856,7 +1856,7 @@
           <a:p>
             <a:fld id="{E9BF1F2D-2AEF-4074-BE6D-430396F80950}" type="datetimeFigureOut">
               <a:rPr lang="en-US" smtClean="0"/>
-              <a:t>4/27/2020</a:t>
+              <a:t>5/2/2020</a:t>
             </a:fld>
             <a:endParaRPr lang="en-US"/>
           </a:p>
@@ -2133,7 +2133,7 @@
           <a:p>
             <a:fld id="{E9BF1F2D-2AEF-4074-BE6D-430396F80950}" type="datetimeFigureOut">
               <a:rPr lang="en-US" smtClean="0"/>
-              <a:t>4/27/2020</a:t>
+              <a:t>5/2/2020</a:t>
             </a:fld>
             <a:endParaRPr lang="en-US"/>
           </a:p>
@@ -2390,7 +2390,7 @@
           <a:p>
             <a:fld id="{E9BF1F2D-2AEF-4074-BE6D-430396F80950}" type="datetimeFigureOut">
               <a:rPr lang="en-US" smtClean="0"/>
-              <a:t>4/27/2020</a:t>
+              <a:t>5/2/2020</a:t>
             </a:fld>
             <a:endParaRPr lang="en-US"/>
           </a:p>
@@ -2603,7 +2603,7 @@
           <a:p>
             <a:fld id="{E9BF1F2D-2AEF-4074-BE6D-430396F80950}" type="datetimeFigureOut">
               <a:rPr lang="en-US" smtClean="0"/>
-              <a:t>4/27/2020</a:t>
+              <a:t>5/2/2020</a:t>
             </a:fld>
             <a:endParaRPr lang="en-US"/>
           </a:p>
@@ -3035,7 +3035,7 @@
                 <a:solidFill>
                   <a:srgbClr val="7030A0"/>
                 </a:solidFill>
-                <a:latin typeface="Peace Sans" panose="02000505040000020004" pitchFamily="50" charset="0"/>
+                <a:latin typeface="Articulate Extrabold" panose="02000503050000020004" pitchFamily="2" charset="0"/>
                 <a:ea typeface="FuturaHandwritten" panose="02000603000000000000" pitchFamily="2" charset="0"/>
               </a:rPr>
               <a:t>Carbohydrates Guide</a:t>

</xml_diff>